<commit_message>
Updated copy waiting for approval
</commit_message>
<xml_diff>
--- a/Movie_Analysis_Presentation latest copy.pptx
+++ b/Movie_Analysis_Presentation latest copy.pptx
@@ -9,12 +9,22 @@
     <p:sldId id="257" r:id="rId3"/>
     <p:sldId id="266" r:id="rId4"/>
     <p:sldId id="258" r:id="rId5"/>
-    <p:sldId id="259" r:id="rId6"/>
-    <p:sldId id="260" r:id="rId7"/>
-    <p:sldId id="261" r:id="rId8"/>
-    <p:sldId id="262" r:id="rId9"/>
-    <p:sldId id="263" r:id="rId10"/>
-    <p:sldId id="264" r:id="rId11"/>
+    <p:sldId id="270" r:id="rId6"/>
+    <p:sldId id="259" r:id="rId7"/>
+    <p:sldId id="271" r:id="rId8"/>
+    <p:sldId id="260" r:id="rId9"/>
+    <p:sldId id="268" r:id="rId10"/>
+    <p:sldId id="274" r:id="rId11"/>
+    <p:sldId id="275" r:id="rId12"/>
+    <p:sldId id="272" r:id="rId13"/>
+    <p:sldId id="273" r:id="rId14"/>
+    <p:sldId id="276" r:id="rId15"/>
+    <p:sldId id="277" r:id="rId16"/>
+    <p:sldId id="261" r:id="rId17"/>
+    <p:sldId id="269" r:id="rId18"/>
+    <p:sldId id="262" r:id="rId19"/>
+    <p:sldId id="263" r:id="rId20"/>
+    <p:sldId id="264" r:id="rId21"/>
   </p:sldIdLst>
   <p:sldSz cx="9144000" cy="6858000" type="screen4x3"/>
   <p:notesSz cx="6858000" cy="9144000"/>
@@ -7712,6 +7722,10 @@
               <a:t>Launch</a:t>
             </a:r>
             <a:r>
+              <a:rPr lang="en-US" sz="2800" b="1" dirty="0"/>
+              <a:t>.</a:t>
+            </a:r>
+            <a:r>
               <a:rPr lang="en-US" sz="2800" b="1" dirty="0" smtClean="0"/>
               <a:t/>
             </a:r>
@@ -7734,8 +7748,8 @@
         </p:nvSpPr>
         <p:spPr>
           <a:xfrm>
-            <a:off x="1942416" y="2798617"/>
-            <a:ext cx="6924493" cy="3629891"/>
+            <a:off x="1942416" y="3038764"/>
+            <a:ext cx="6924493" cy="3389744"/>
           </a:xfrm>
         </p:spPr>
         <p:txBody>
@@ -7745,18 +7759,24 @@
           <a:lstStyle/>
           <a:p>
             <a:r>
-              <a:rPr lang="en-US" b="1" dirty="0" smtClean="0"/>
+              <a:rPr lang="en-US" sz="2400" b="1" dirty="0" smtClean="0"/>
               <a:t>Objective</a:t>
             </a:r>
             <a:r>
+              <a:rPr lang="en-US" sz="2400" dirty="0" smtClean="0"/>
+              <a:t>: </a:t>
+            </a:r>
+            <a:endParaRPr lang="en-US" sz="2400" dirty="0" smtClean="0"/>
+          </a:p>
+          <a:p>
+            <a:r>
               <a:rPr lang="en-US" dirty="0" smtClean="0"/>
-              <a:t>: This </a:t>
+              <a:t>This </a:t>
             </a:r>
             <a:r>
               <a:rPr lang="en-US" dirty="0"/>
               <a:t>project aims to guide the establishment of a new movie studio by providing actionable insights into the key factors driving box office success. </a:t>
             </a:r>
-            <a:endParaRPr lang="en-US" dirty="0"/>
           </a:p>
           <a:p>
             <a:r>
@@ -7775,7 +7795,6 @@
               <a:rPr lang="en-US" dirty="0"/>
               <a:t>), and the numbers to understand what types of movies perform well at the box office. </a:t>
             </a:r>
-            <a:endParaRPr lang="en-US" dirty="0"/>
           </a:p>
           <a:p>
             <a:r>
@@ -7827,8 +7846,338 @@
         </p:nvSpPr>
         <p:spPr>
           <a:xfrm>
-            <a:off x="1945201" y="624110"/>
-            <a:ext cx="6589199" cy="724399"/>
+            <a:off x="2071396" y="317242"/>
+            <a:ext cx="6463004" cy="513182"/>
+          </a:xfrm>
+        </p:spPr>
+        <p:txBody>
+          <a:bodyPr>
+            <a:normAutofit fontScale="90000"/>
+          </a:bodyPr>
+          <a:lstStyle/>
+          <a:p>
+            <a:r>
+              <a:rPr lang="en-US" sz="2800" b="1" dirty="0" smtClean="0"/>
+              <a:t>Result and findings: </a:t>
+            </a:r>
+            <a:r>
+              <a:rPr lang="en-US" sz="2800" dirty="0" smtClean="0"/>
+              <a:t/>
+            </a:r>
+            <a:br>
+              <a:rPr lang="en-US" sz="2800" dirty="0" smtClean="0"/>
+            </a:br>
+            <a:r>
+              <a:rPr lang="en-US" sz="2800" dirty="0" smtClean="0"/>
+              <a:t/>
+            </a:r>
+            <a:br>
+              <a:rPr lang="en-US" sz="2800" dirty="0" smtClean="0"/>
+            </a:br>
+            <a:r>
+              <a:rPr lang="en-US" sz="2800" dirty="0" smtClean="0"/>
+              <a:t>Vote average vs popularity by main genre.</a:t>
+            </a:r>
+            <a:endParaRPr lang="en-US" sz="2800" dirty="0"/>
+          </a:p>
+        </p:txBody>
+      </p:sp>
+      <p:pic>
+        <p:nvPicPr>
+          <p:cNvPr id="4" name="Content Placeholder 3"/>
+          <p:cNvPicPr>
+            <a:picLocks noGrp="1" noChangeAspect="1"/>
+          </p:cNvPicPr>
+          <p:nvPr>
+            <p:ph idx="1"/>
+          </p:nvPr>
+        </p:nvPicPr>
+        <p:blipFill>
+          <a:blip r:embed="rId2"/>
+          <a:stretch>
+            <a:fillRect/>
+          </a:stretch>
+        </p:blipFill>
+        <p:spPr>
+          <a:xfrm>
+            <a:off x="1302405" y="2058955"/>
+            <a:ext cx="7459040" cy="4696408"/>
+          </a:xfrm>
+          <a:prstGeom prst="rect">
+            <a:avLst/>
+          </a:prstGeom>
+        </p:spPr>
+      </p:pic>
+    </p:spTree>
+    <p:extLst>
+      <p:ext uri="{BB962C8B-B14F-4D97-AF65-F5344CB8AC3E}">
+        <p14:creationId xmlns:p14="http://schemas.microsoft.com/office/powerpoint/2010/main" val="112479799"/>
+      </p:ext>
+    </p:extLst>
+  </p:cSld>
+  <p:clrMapOvr>
+    <a:masterClrMapping/>
+  </p:clrMapOvr>
+</p:sld>
+</file>
+
+<file path=ppt/slides/slide11.xml><?xml version="1.0" encoding="utf-8"?>
+<p:sld xmlns:a="http://schemas.openxmlformats.org/drawingml/2006/main" xmlns:r="http://schemas.openxmlformats.org/officeDocument/2006/relationships" xmlns:p="http://schemas.openxmlformats.org/presentationml/2006/main">
+  <p:cSld>
+    <p:spTree>
+      <p:nvGrpSpPr>
+        <p:cNvPr id="1" name=""/>
+        <p:cNvGrpSpPr/>
+        <p:nvPr/>
+      </p:nvGrpSpPr>
+      <p:grpSpPr>
+        <a:xfrm>
+          <a:off x="0" y="0"/>
+          <a:ext cx="0" cy="0"/>
+          <a:chOff x="0" y="0"/>
+          <a:chExt cx="0" cy="0"/>
+        </a:xfrm>
+      </p:grpSpPr>
+      <p:sp>
+        <p:nvSpPr>
+          <p:cNvPr id="2" name="Rectangle 1"/>
+          <p:cNvSpPr/>
+          <p:nvPr/>
+        </p:nvSpPr>
+        <p:spPr>
+          <a:xfrm>
+            <a:off x="1306287" y="612845"/>
+            <a:ext cx="7389844" cy="4524315"/>
+          </a:xfrm>
+          <a:prstGeom prst="rect">
+            <a:avLst/>
+          </a:prstGeom>
+        </p:spPr>
+        <p:txBody>
+          <a:bodyPr wrap="square">
+            <a:spAutoFit/>
+          </a:bodyPr>
+          <a:lstStyle/>
+          <a:p>
+            <a:pPr marL="285750" indent="-285750">
+              <a:buFont typeface="Arial" panose="020B0604020202020204" pitchFamily="34" charset="0"/>
+              <a:buChar char="•"/>
+            </a:pPr>
+            <a:r>
+              <a:rPr lang="en-US" dirty="0"/>
+              <a:t>Popularity vs Ratings: From the chart we can </a:t>
+            </a:r>
+            <a:r>
+              <a:rPr lang="en-US" dirty="0" smtClean="0"/>
+              <a:t>see viewer </a:t>
+            </a:r>
+            <a:r>
+              <a:rPr lang="en-US" dirty="0"/>
+              <a:t>ratings of 6 and above indicate high popularity in the movies</a:t>
+            </a:r>
+            <a:r>
+              <a:rPr lang="en-US" dirty="0" smtClean="0"/>
+              <a:t>. </a:t>
+            </a:r>
+          </a:p>
+          <a:p>
+            <a:pPr marL="285750" indent="-285750">
+              <a:buFont typeface="Arial" panose="020B0604020202020204" pitchFamily="34" charset="0"/>
+              <a:buChar char="•"/>
+            </a:pPr>
+            <a:endParaRPr lang="en-US" dirty="0"/>
+          </a:p>
+          <a:p>
+            <a:pPr marL="285750" indent="-285750">
+              <a:buFont typeface="Arial" panose="020B0604020202020204" pitchFamily="34" charset="0"/>
+              <a:buChar char="•"/>
+            </a:pPr>
+            <a:r>
+              <a:rPr lang="en-US" dirty="0" smtClean="0"/>
+              <a:t>Popular </a:t>
+            </a:r>
+            <a:r>
+              <a:rPr lang="en-US" dirty="0"/>
+              <a:t>action movies may bring in a large audience for their flashy effects and colorful explosions, but those films end up having mixed or average reviews.  </a:t>
+            </a:r>
+            <a:endParaRPr lang="en-US" dirty="0" smtClean="0"/>
+          </a:p>
+          <a:p>
+            <a:pPr marL="285750" indent="-285750">
+              <a:buFont typeface="Arial" panose="020B0604020202020204" pitchFamily="34" charset="0"/>
+              <a:buChar char="•"/>
+            </a:pPr>
+            <a:endParaRPr lang="en-US" dirty="0"/>
+          </a:p>
+          <a:p>
+            <a:pPr marL="285750" indent="-285750">
+              <a:buFont typeface="Arial" panose="020B0604020202020204" pitchFamily="34" charset="0"/>
+              <a:buChar char="•"/>
+            </a:pPr>
+            <a:r>
+              <a:rPr lang="en-US" dirty="0" smtClean="0"/>
+              <a:t>Drama</a:t>
+            </a:r>
+            <a:r>
+              <a:rPr lang="en-US" dirty="0"/>
+              <a:t>, Animation and Family genres have gentler extremes, whereas Action, Sci-Fi, and Adventure tend to be more polarized with their reception. Because of differing audience expectations, some are likely to love them, and some will definitely hate them.  </a:t>
+            </a:r>
+            <a:endParaRPr lang="en-US" dirty="0" smtClean="0"/>
+          </a:p>
+          <a:p>
+            <a:pPr marL="285750" indent="-285750">
+              <a:buFont typeface="Arial" panose="020B0604020202020204" pitchFamily="34" charset="0"/>
+              <a:buChar char="•"/>
+            </a:pPr>
+            <a:endParaRPr lang="en-US" dirty="0"/>
+          </a:p>
+          <a:p>
+            <a:pPr marL="285750" indent="-285750">
+              <a:buFont typeface="Arial" panose="020B0604020202020204" pitchFamily="34" charset="0"/>
+              <a:buChar char="•"/>
+            </a:pPr>
+            <a:r>
+              <a:rPr lang="en-US" dirty="0" smtClean="0"/>
+              <a:t>When </a:t>
+            </a:r>
+            <a:r>
+              <a:rPr lang="en-US" dirty="0"/>
+              <a:t>planning films, especially for large scale blockbusters versus small scale niche films, studios must consider the possible popularity level and how the audience will receive it.</a:t>
+            </a:r>
+          </a:p>
+        </p:txBody>
+      </p:sp>
+    </p:spTree>
+    <p:extLst>
+      <p:ext uri="{BB962C8B-B14F-4D97-AF65-F5344CB8AC3E}">
+        <p14:creationId xmlns:p14="http://schemas.microsoft.com/office/powerpoint/2010/main" val="182118639"/>
+      </p:ext>
+    </p:extLst>
+  </p:cSld>
+  <p:clrMapOvr>
+    <a:masterClrMapping/>
+  </p:clrMapOvr>
+</p:sld>
+</file>
+
+<file path=ppt/slides/slide12.xml><?xml version="1.0" encoding="utf-8"?>
+<p:sld xmlns:a="http://schemas.openxmlformats.org/drawingml/2006/main" xmlns:r="http://schemas.openxmlformats.org/officeDocument/2006/relationships" xmlns:p="http://schemas.openxmlformats.org/presentationml/2006/main">
+  <p:cSld>
+    <p:spTree>
+      <p:nvGrpSpPr>
+        <p:cNvPr id="1" name=""/>
+        <p:cNvGrpSpPr/>
+        <p:nvPr/>
+      </p:nvGrpSpPr>
+      <p:grpSpPr>
+        <a:xfrm>
+          <a:off x="0" y="0"/>
+          <a:ext cx="0" cy="0"/>
+          <a:chOff x="0" y="0"/>
+          <a:chExt cx="0" cy="0"/>
+        </a:xfrm>
+      </p:grpSpPr>
+      <p:pic>
+        <p:nvPicPr>
+          <p:cNvPr id="2" name="Picture 1"/>
+          <p:cNvPicPr>
+            <a:picLocks noChangeAspect="1"/>
+          </p:cNvPicPr>
+          <p:nvPr/>
+        </p:nvPicPr>
+        <p:blipFill>
+          <a:blip r:embed="rId2"/>
+          <a:stretch>
+            <a:fillRect/>
+          </a:stretch>
+        </p:blipFill>
+        <p:spPr>
+          <a:xfrm>
+            <a:off x="1212980" y="830425"/>
+            <a:ext cx="7791061" cy="5701004"/>
+          </a:xfrm>
+          <a:prstGeom prst="rect">
+            <a:avLst/>
+          </a:prstGeom>
+        </p:spPr>
+      </p:pic>
+      <p:sp>
+        <p:nvSpPr>
+          <p:cNvPr id="3" name="Rectangle 2"/>
+          <p:cNvSpPr/>
+          <p:nvPr/>
+        </p:nvSpPr>
+        <p:spPr>
+          <a:xfrm>
+            <a:off x="1800808" y="0"/>
+            <a:ext cx="6885992" cy="584775"/>
+          </a:xfrm>
+          <a:prstGeom prst="rect">
+            <a:avLst/>
+          </a:prstGeom>
+        </p:spPr>
+        <p:txBody>
+          <a:bodyPr wrap="square">
+            <a:spAutoFit/>
+          </a:bodyPr>
+          <a:lstStyle/>
+          <a:p>
+            <a:r>
+              <a:rPr lang="en-US" sz="1600" b="1" dirty="0"/>
+              <a:t>Checking the correlation using popularity,vote_average and </a:t>
+            </a:r>
+            <a:r>
+              <a:rPr lang="en-US" sz="1600" b="1" dirty="0" smtClean="0"/>
+              <a:t>vote count.</a:t>
+            </a:r>
+            <a:endParaRPr lang="en-US" sz="1600" dirty="0"/>
+          </a:p>
+        </p:txBody>
+      </p:sp>
+    </p:spTree>
+    <p:extLst>
+      <p:ext uri="{BB962C8B-B14F-4D97-AF65-F5344CB8AC3E}">
+        <p14:creationId xmlns:p14="http://schemas.microsoft.com/office/powerpoint/2010/main" val="744846116"/>
+      </p:ext>
+    </p:extLst>
+  </p:cSld>
+  <p:clrMapOvr>
+    <a:masterClrMapping/>
+  </p:clrMapOvr>
+</p:sld>
+</file>
+
+<file path=ppt/slides/slide13.xml><?xml version="1.0" encoding="utf-8"?>
+<p:sld xmlns:a="http://schemas.openxmlformats.org/drawingml/2006/main" xmlns:r="http://schemas.openxmlformats.org/officeDocument/2006/relationships" xmlns:p="http://schemas.openxmlformats.org/presentationml/2006/main">
+  <p:cSld>
+    <p:spTree>
+      <p:nvGrpSpPr>
+        <p:cNvPr id="1" name=""/>
+        <p:cNvGrpSpPr/>
+        <p:nvPr/>
+      </p:nvGrpSpPr>
+      <p:grpSpPr>
+        <a:xfrm>
+          <a:off x="0" y="0"/>
+          <a:ext cx="0" cy="0"/>
+          <a:chOff x="0" y="0"/>
+          <a:chExt cx="0" cy="0"/>
+        </a:xfrm>
+      </p:grpSpPr>
+      <p:sp>
+        <p:nvSpPr>
+          <p:cNvPr id="2" name="Title 1"/>
+          <p:cNvSpPr>
+            <a:spLocks noGrp="1"/>
+          </p:cNvSpPr>
+          <p:nvPr>
+            <p:ph type="title"/>
+          </p:nvPr>
+        </p:nvSpPr>
+        <p:spPr>
+          <a:xfrm>
+            <a:off x="1637615" y="457855"/>
+            <a:ext cx="6792399" cy="1546436"/>
           </a:xfrm>
         </p:spPr>
         <p:txBody>
@@ -7838,17 +8187,13 @@
           <a:lstStyle/>
           <a:p>
             <a:r>
-              <a:rPr lang="en-US" sz="2800" b="1" dirty="0" smtClean="0"/>
-              <a:t> </a:t>
-            </a:r>
-            <a:r>
-              <a:rPr sz="2800" b="1" dirty="0" smtClean="0"/>
-              <a:t>Q&amp;A </a:t>
-            </a:r>
-            <a:r>
-              <a:rPr sz="2800" b="1" dirty="0"/>
-              <a:t>/ Conclusion</a:t>
-            </a:r>
+              <a:rPr lang="en-US" dirty="0"/>
+              <a:t/>
+            </a:r>
+            <a:br>
+              <a:rPr lang="en-US" dirty="0"/>
+            </a:br>
+            <a:endParaRPr lang="en-US" dirty="0"/>
           </a:p>
         </p:txBody>
       </p:sp>
@@ -7864,8 +8209,192 @@
         </p:nvSpPr>
         <p:spPr>
           <a:xfrm>
-            <a:off x="1942415" y="1727200"/>
-            <a:ext cx="6591985" cy="4184022"/>
+            <a:off x="1637615" y="886408"/>
+            <a:ext cx="7263789" cy="4945225"/>
+          </a:xfrm>
+        </p:spPr>
+        <p:txBody>
+          <a:bodyPr/>
+          <a:lstStyle/>
+          <a:p>
+            <a:r>
+              <a:rPr lang="en-US" dirty="0"/>
+              <a:t>Brighter red cells: </a:t>
+            </a:r>
+            <a:r>
+              <a:rPr lang="en-US" dirty="0" smtClean="0"/>
+              <a:t>Indicate strong </a:t>
+            </a:r>
+            <a:r>
+              <a:rPr lang="en-US" dirty="0"/>
+              <a:t>positive </a:t>
+            </a:r>
+            <a:r>
+              <a:rPr lang="en-US" dirty="0" smtClean="0"/>
+              <a:t>correlation</a:t>
+            </a:r>
+          </a:p>
+          <a:p>
+            <a:r>
+              <a:rPr lang="en-US" dirty="0" smtClean="0"/>
+              <a:t>Brighter </a:t>
+            </a:r>
+            <a:r>
+              <a:rPr lang="en-US" dirty="0"/>
+              <a:t>blue cells</a:t>
+            </a:r>
+            <a:r>
+              <a:rPr lang="en-US" dirty="0" smtClean="0"/>
+              <a:t>: indicate strong </a:t>
+            </a:r>
+            <a:r>
+              <a:rPr lang="en-US" dirty="0"/>
+              <a:t>negative </a:t>
+            </a:r>
+            <a:r>
+              <a:rPr lang="en-US" dirty="0" smtClean="0"/>
+              <a:t>correlation</a:t>
+            </a:r>
+          </a:p>
+          <a:p>
+            <a:r>
+              <a:rPr lang="en-US" dirty="0" smtClean="0"/>
+              <a:t>How </a:t>
+            </a:r>
+            <a:r>
+              <a:rPr lang="en-US" dirty="0"/>
+              <a:t>to </a:t>
+            </a:r>
+            <a:r>
+              <a:rPr lang="en-US" dirty="0" err="1"/>
+              <a:t>InterpretGenres</a:t>
+            </a:r>
+            <a:r>
+              <a:rPr lang="en-US" dirty="0"/>
+              <a:t> with high values in “popularity” column: More likely to attract large audiences</a:t>
+            </a:r>
+            <a:r>
+              <a:rPr lang="en-US" dirty="0" smtClean="0"/>
+              <a:t>.</a:t>
+            </a:r>
+          </a:p>
+          <a:p>
+            <a:r>
+              <a:rPr lang="en-US" dirty="0" smtClean="0"/>
+              <a:t>Genres </a:t>
+            </a:r>
+            <a:r>
+              <a:rPr lang="en-US" dirty="0"/>
+              <a:t>with high “</a:t>
+            </a:r>
+            <a:r>
+              <a:rPr lang="en-US" dirty="0" err="1"/>
+              <a:t>vote_average</a:t>
+            </a:r>
+            <a:r>
+              <a:rPr lang="en-US" dirty="0"/>
+              <a:t>”: Likely critically acclaimed</a:t>
+            </a:r>
+            <a:r>
+              <a:rPr lang="en-US" dirty="0" smtClean="0"/>
+              <a:t>.</a:t>
+            </a:r>
+          </a:p>
+          <a:p>
+            <a:r>
+              <a:rPr lang="en-US" dirty="0" smtClean="0"/>
+              <a:t>Genres </a:t>
+            </a:r>
+            <a:r>
+              <a:rPr lang="en-US" dirty="0"/>
+              <a:t>with high “</a:t>
+            </a:r>
+            <a:r>
+              <a:rPr lang="en-US" dirty="0" err="1"/>
+              <a:t>vote_count</a:t>
+            </a:r>
+            <a:r>
+              <a:rPr lang="en-US" dirty="0"/>
+              <a:t>”: Receive more viewer engagement or mainstream appeal</a:t>
+            </a:r>
+            <a:r>
+              <a:rPr lang="en-US" dirty="0" smtClean="0"/>
+              <a:t>.</a:t>
+            </a:r>
+            <a:endParaRPr lang="en-US" dirty="0"/>
+          </a:p>
+          <a:p>
+            <a:pPr marL="0" indent="0">
+              <a:buNone/>
+            </a:pPr>
+            <a:r>
+              <a:rPr lang="en-US" b="1" dirty="0"/>
+              <a:t>Insight</a:t>
+            </a:r>
+            <a:r>
+              <a:rPr lang="en-US" b="1" dirty="0" smtClean="0"/>
+              <a:t>:-</a:t>
+            </a:r>
+          </a:p>
+          <a:p>
+            <a:pPr marL="0" indent="0">
+              <a:buNone/>
+            </a:pPr>
+            <a:r>
+              <a:rPr lang="en-US" dirty="0" smtClean="0"/>
+              <a:t> </a:t>
+            </a:r>
+            <a:r>
+              <a:rPr lang="en-US" dirty="0"/>
+              <a:t>If your studio wants high **popularity and engagement**, focus on **Action**, **Adventure**, or **Sci-Fi**.- If aiming for **high ratings**, **Documentary** and **History** genres show stronger positive correlations.</a:t>
+            </a:r>
+          </a:p>
+        </p:txBody>
+      </p:sp>
+    </p:spTree>
+    <p:extLst>
+      <p:ext uri="{BB962C8B-B14F-4D97-AF65-F5344CB8AC3E}">
+        <p14:creationId xmlns:p14="http://schemas.microsoft.com/office/powerpoint/2010/main" val="3062986891"/>
+      </p:ext>
+    </p:extLst>
+  </p:cSld>
+  <p:clrMapOvr>
+    <a:masterClrMapping/>
+  </p:clrMapOvr>
+</p:sld>
+</file>
+
+<file path=ppt/slides/slide14.xml><?xml version="1.0" encoding="utf-8"?>
+<p:sld xmlns:a="http://schemas.openxmlformats.org/drawingml/2006/main" xmlns:r="http://schemas.openxmlformats.org/officeDocument/2006/relationships" xmlns:p="http://schemas.openxmlformats.org/presentationml/2006/main">
+  <p:cSld>
+    <p:spTree>
+      <p:nvGrpSpPr>
+        <p:cNvPr id="1" name=""/>
+        <p:cNvGrpSpPr/>
+        <p:nvPr/>
+      </p:nvGrpSpPr>
+      <p:grpSpPr>
+        <a:xfrm>
+          <a:off x="0" y="0"/>
+          <a:ext cx="0" cy="0"/>
+          <a:chOff x="0" y="0"/>
+          <a:chExt cx="0" cy="0"/>
+        </a:xfrm>
+      </p:grpSpPr>
+      <p:sp>
+        <p:nvSpPr>
+          <p:cNvPr id="2" name="Title 1"/>
+          <p:cNvSpPr>
+            <a:spLocks noGrp="1"/>
+          </p:cNvSpPr>
+          <p:nvPr>
+            <p:ph type="title"/>
+          </p:nvPr>
+        </p:nvSpPr>
+        <p:spPr>
+          <a:xfrm>
+            <a:off x="1945201" y="624109"/>
+            <a:ext cx="6993526" cy="1951139"/>
           </a:xfrm>
         </p:spPr>
         <p:txBody>
@@ -7875,112 +8404,859 @@
           <a:lstStyle/>
           <a:p>
             <a:r>
-              <a:rPr sz="2000" dirty="0"/>
-              <a:t>This concludes the presentation</a:t>
-            </a:r>
-            <a:r>
-              <a:rPr sz="2000" dirty="0" smtClean="0"/>
+              <a:rPr lang="en-US" sz="2800" b="1" dirty="0" smtClean="0"/>
+              <a:t>Results and findings:</a:t>
+            </a:r>
+            <a:br>
+              <a:rPr lang="en-US" sz="2800" b="1" dirty="0" smtClean="0"/>
+            </a:br>
+            <a:r>
+              <a:rPr lang="en-US" sz="2800" dirty="0" smtClean="0"/>
+              <a:t/>
+            </a:r>
+            <a:br>
+              <a:rPr lang="en-US" sz="2800" dirty="0" smtClean="0"/>
+            </a:br>
+            <a:r>
+              <a:rPr lang="en-US" sz="2800" dirty="0" smtClean="0"/>
+              <a:t>Return on investment vs Production Budget.</a:t>
+            </a:r>
+            <a:endParaRPr lang="en-US" sz="2800" dirty="0"/>
+          </a:p>
+        </p:txBody>
+      </p:sp>
+      <p:pic>
+        <p:nvPicPr>
+          <p:cNvPr id="4" name="Content Placeholder 3"/>
+          <p:cNvPicPr>
+            <a:picLocks noGrp="1" noChangeAspect="1"/>
+          </p:cNvPicPr>
+          <p:nvPr>
+            <p:ph idx="1"/>
+          </p:nvPr>
+        </p:nvPicPr>
+        <p:blipFill>
+          <a:blip r:embed="rId2"/>
+          <a:stretch>
+            <a:fillRect/>
+          </a:stretch>
+        </p:blipFill>
+        <p:spPr>
+          <a:xfrm>
+            <a:off x="2056559" y="3079750"/>
+            <a:ext cx="5767223" cy="3778250"/>
+          </a:xfrm>
+          <a:prstGeom prst="rect">
+            <a:avLst/>
+          </a:prstGeom>
+        </p:spPr>
+      </p:pic>
+    </p:spTree>
+    <p:extLst>
+      <p:ext uri="{BB962C8B-B14F-4D97-AF65-F5344CB8AC3E}">
+        <p14:creationId xmlns:p14="http://schemas.microsoft.com/office/powerpoint/2010/main" val="649626436"/>
+      </p:ext>
+    </p:extLst>
+  </p:cSld>
+  <p:clrMapOvr>
+    <a:masterClrMapping/>
+  </p:clrMapOvr>
+</p:sld>
+</file>
+
+<file path=ppt/slides/slide15.xml><?xml version="1.0" encoding="utf-8"?>
+<p:sld xmlns:a="http://schemas.openxmlformats.org/drawingml/2006/main" xmlns:r="http://schemas.openxmlformats.org/officeDocument/2006/relationships" xmlns:p="http://schemas.openxmlformats.org/presentationml/2006/main">
+  <p:cSld>
+    <p:spTree>
+      <p:nvGrpSpPr>
+        <p:cNvPr id="1" name=""/>
+        <p:cNvGrpSpPr/>
+        <p:nvPr/>
+      </p:nvGrpSpPr>
+      <p:grpSpPr>
+        <a:xfrm>
+          <a:off x="0" y="0"/>
+          <a:ext cx="0" cy="0"/>
+          <a:chOff x="0" y="0"/>
+          <a:chExt cx="0" cy="0"/>
+        </a:xfrm>
+      </p:grpSpPr>
+      <p:sp>
+        <p:nvSpPr>
+          <p:cNvPr id="2" name="Rectangle 1"/>
+          <p:cNvSpPr/>
+          <p:nvPr/>
+        </p:nvSpPr>
+        <p:spPr>
+          <a:xfrm>
+            <a:off x="1231641" y="401216"/>
+            <a:ext cx="7595118" cy="6351651"/>
+          </a:xfrm>
+          <a:prstGeom prst="rect">
+            <a:avLst/>
+          </a:prstGeom>
+        </p:spPr>
+        <p:txBody>
+          <a:bodyPr wrap="square">
+            <a:spAutoFit/>
+          </a:bodyPr>
+          <a:lstStyle/>
+          <a:p>
+            <a:r>
+              <a:rPr lang="en-US" sz="1600" b="1" dirty="0" smtClean="0"/>
+              <a:t> </a:t>
+            </a:r>
+            <a:r>
+              <a:rPr lang="en-US" sz="1750" b="1" dirty="0"/>
+              <a:t>Aim</a:t>
+            </a:r>
+            <a:r>
+              <a:rPr lang="en-US" sz="1750" b="1" dirty="0" smtClean="0"/>
+              <a:t>:</a:t>
+            </a:r>
+          </a:p>
+          <a:p>
+            <a:r>
+              <a:rPr lang="en-US" sz="1750" dirty="0" smtClean="0"/>
+              <a:t>For </a:t>
+            </a:r>
+            <a:r>
+              <a:rPr lang="en-US" sz="1750" dirty="0"/>
+              <a:t>every \$1 that was spent, how much (%) did they get back in profit</a:t>
+            </a:r>
+            <a:r>
+              <a:rPr lang="en-US" sz="1750" dirty="0" smtClean="0"/>
+              <a:t>?</a:t>
+            </a:r>
+          </a:p>
+          <a:p>
+            <a:pPr marL="285750" indent="-285750">
+              <a:buFont typeface="Arial" panose="020B0604020202020204" pitchFamily="34" charset="0"/>
+              <a:buChar char="•"/>
+            </a:pPr>
+            <a:r>
+              <a:rPr lang="en-US" sz="1750" b="1" dirty="0" smtClean="0"/>
+              <a:t>Observations:</a:t>
+            </a:r>
+          </a:p>
+          <a:p>
+            <a:pPr marL="342900" indent="-342900">
+              <a:buAutoNum type="arabicPeriod"/>
+            </a:pPr>
+            <a:r>
+              <a:rPr lang="en-US" sz="1750" dirty="0" smtClean="0"/>
+              <a:t>High </a:t>
+            </a:r>
+            <a:r>
+              <a:rPr lang="en-US" sz="1750" dirty="0"/>
+              <a:t>ROI isn't tied to high budget - The movies with the highest ROI are mostly in the low to mid-budget range (\$10k–\$1M</a:t>
+            </a:r>
+            <a:r>
+              <a:rPr lang="en-US" sz="1750" dirty="0" smtClean="0"/>
+              <a:t>).</a:t>
+            </a:r>
+          </a:p>
+          <a:p>
+            <a:pPr marL="342900" indent="-342900">
+              <a:buAutoNum type="arabicPeriod"/>
+            </a:pPr>
+            <a:r>
+              <a:rPr lang="en-US" sz="1750" dirty="0" smtClean="0"/>
+              <a:t>Big </a:t>
+            </a:r>
+            <a:r>
+              <a:rPr lang="en-US" sz="1750" dirty="0"/>
+              <a:t>budgets ≠ big ROI - Expensive movies (&gt;\$100M or 10^(8)) tend to have lower ROI, even if they make lots of money because their production costs are huge</a:t>
+            </a:r>
+            <a:r>
+              <a:rPr lang="en-US" sz="1750" dirty="0" smtClean="0"/>
               <a:t>.</a:t>
             </a:r>
-            <a:endParaRPr sz="2000" dirty="0"/>
-          </a:p>
-          <a:p>
-            <a:r>
-              <a:rPr sz="2000" dirty="0"/>
-              <a:t>Let’s discuss your questions and </a:t>
-            </a:r>
-            <a:r>
-              <a:rPr sz="2000" dirty="0" smtClean="0"/>
-              <a:t>ideas.</a:t>
-            </a:r>
-            <a:endParaRPr lang="en-US" sz="2000" dirty="0"/>
-          </a:p>
-          <a:p>
-            <a:pPr marL="0" indent="0">
-              <a:buNone/>
+          </a:p>
+          <a:p>
+            <a:pPr marL="342900" indent="-342900">
+              <a:buAutoNum type="arabicPeriod"/>
             </a:pPr>
             <a:r>
-              <a:rPr lang="en-US" sz="2000" dirty="0" smtClean="0"/>
-              <a:t>         </a:t>
-            </a:r>
-            <a:r>
-              <a:rPr lang="en-US" sz="2000" b="1" dirty="0" smtClean="0"/>
-              <a:t>Authors</a:t>
-            </a:r>
-          </a:p>
-          <a:p>
-            <a:pPr marL="0" indent="0">
-              <a:buNone/>
+              <a:rPr lang="en-US" sz="1750" dirty="0" smtClean="0"/>
+              <a:t>Diminishing </a:t>
+            </a:r>
+            <a:r>
+              <a:rPr lang="en-US" sz="1750" dirty="0"/>
+              <a:t>returns at higher budgets - As budgets grow, ROI tends to flatten. Studios make profits, but the percentage return </a:t>
+            </a:r>
+            <a:r>
+              <a:rPr lang="en-US" sz="1750" dirty="0" smtClean="0"/>
+              <a:t>shrinks</a:t>
+            </a:r>
+            <a:r>
+              <a:rPr lang="en-US" sz="1750" dirty="0"/>
+              <a:t>.</a:t>
+            </a:r>
+            <a:endParaRPr lang="en-US" sz="1750" dirty="0" smtClean="0"/>
+          </a:p>
+          <a:p>
+            <a:pPr marL="285750" indent="-285750">
+              <a:buFont typeface="Arial" panose="020B0604020202020204" pitchFamily="34" charset="0"/>
+              <a:buChar char="•"/>
             </a:pPr>
-            <a:r>
-              <a:rPr lang="en-US" sz="2000" dirty="0" err="1" smtClean="0"/>
-              <a:t>Hafsa</a:t>
-            </a:r>
-            <a:r>
-              <a:rPr lang="en-US" sz="2000" dirty="0" smtClean="0"/>
-              <a:t> Mohammed</a:t>
-            </a:r>
-          </a:p>
-          <a:p>
-            <a:pPr marL="0" indent="0">
-              <a:buNone/>
+            <a:endParaRPr lang="en-US" sz="1750" dirty="0"/>
+          </a:p>
+          <a:p>
+            <a:pPr marL="285750" indent="-285750">
+              <a:buFont typeface="Arial" panose="020B0604020202020204" pitchFamily="34" charset="0"/>
+              <a:buChar char="•"/>
             </a:pPr>
             <a:r>
-              <a:rPr lang="en-US" sz="2000" dirty="0" smtClean="0"/>
-              <a:t>Ryan </a:t>
-            </a:r>
-            <a:r>
-              <a:rPr lang="en-US" sz="2000" dirty="0" err="1" smtClean="0"/>
-              <a:t>Karimi</a:t>
-            </a:r>
-            <a:endParaRPr lang="en-US" sz="2000" dirty="0" smtClean="0"/>
-          </a:p>
-          <a:p>
-            <a:pPr marL="0" indent="0">
-              <a:buNone/>
+              <a:rPr lang="en-US" sz="1750" b="1" dirty="0" smtClean="0"/>
+              <a:t>Recommendations.</a:t>
+            </a:r>
+          </a:p>
+          <a:p>
+            <a:pPr marL="285750" indent="-285750">
+              <a:buFont typeface="Arial" panose="020B0604020202020204" pitchFamily="34" charset="0"/>
+              <a:buChar char="•"/>
             </a:pPr>
-            <a:r>
-              <a:rPr lang="en-US" sz="2000" dirty="0" smtClean="0"/>
-              <a:t>Rose </a:t>
-            </a:r>
-            <a:r>
-              <a:rPr lang="en-US" sz="2000" dirty="0" err="1" smtClean="0"/>
-              <a:t>Muthini</a:t>
-            </a:r>
-            <a:endParaRPr lang="en-US" sz="2000" dirty="0" smtClean="0"/>
-          </a:p>
-          <a:p>
-            <a:pPr marL="0" indent="0">
-              <a:buNone/>
+            <a:endParaRPr lang="en-US" sz="1750" dirty="0"/>
+          </a:p>
+          <a:p>
+            <a:r>
+              <a:rPr lang="en-US" sz="1750" dirty="0" smtClean="0"/>
+              <a:t>Consider </a:t>
+            </a:r>
+            <a:r>
+              <a:rPr lang="en-US" sz="1750" dirty="0"/>
+              <a:t>low to Mid budget movies as they can be highly profitable - These movies are less risky and often perform better per dollar invested. </a:t>
+            </a:r>
+            <a:endParaRPr lang="en-US" sz="1750" dirty="0" smtClean="0"/>
+          </a:p>
+          <a:p>
+            <a:endParaRPr lang="en-US" sz="1750" dirty="0" smtClean="0"/>
+          </a:p>
+          <a:p>
+            <a:r>
+              <a:rPr lang="en-US" sz="1750" dirty="0" smtClean="0"/>
+              <a:t>For </a:t>
+            </a:r>
+            <a:r>
+              <a:rPr lang="en-US" sz="1750" dirty="0"/>
+              <a:t>example  \$1M movie can return 5000% ROI. Avoid </a:t>
+            </a:r>
+            <a:r>
+              <a:rPr lang="en-US" sz="1750" dirty="0" err="1"/>
+              <a:t>avoid</a:t>
+            </a:r>
+            <a:r>
+              <a:rPr lang="en-US" sz="1750" dirty="0"/>
+              <a:t> mega budgeted movies early on because they don’t guarantee high ROI and they are huge risks because they need global distribution power</a:t>
+            </a:r>
+            <a:r>
+              <a:rPr lang="en-US" sz="1750" dirty="0" smtClean="0"/>
+              <a:t>.</a:t>
+            </a:r>
+            <a:endParaRPr lang="en-US" sz="1750" dirty="0"/>
+          </a:p>
+        </p:txBody>
+      </p:sp>
+    </p:spTree>
+    <p:extLst>
+      <p:ext uri="{BB962C8B-B14F-4D97-AF65-F5344CB8AC3E}">
+        <p14:creationId xmlns:p14="http://schemas.microsoft.com/office/powerpoint/2010/main" val="4281966082"/>
+      </p:ext>
+    </p:extLst>
+  </p:cSld>
+  <p:clrMapOvr>
+    <a:masterClrMapping/>
+  </p:clrMapOvr>
+</p:sld>
+</file>
+
+<file path=ppt/slides/slide16.xml><?xml version="1.0" encoding="utf-8"?>
+<p:sld xmlns:a="http://schemas.openxmlformats.org/drawingml/2006/main" xmlns:r="http://schemas.openxmlformats.org/officeDocument/2006/relationships" xmlns:p="http://schemas.openxmlformats.org/presentationml/2006/main">
+  <p:cSld>
+    <p:spTree>
+      <p:nvGrpSpPr>
+        <p:cNvPr id="1" name=""/>
+        <p:cNvGrpSpPr/>
+        <p:nvPr/>
+      </p:nvGrpSpPr>
+      <p:grpSpPr>
+        <a:xfrm>
+          <a:off x="0" y="0"/>
+          <a:ext cx="0" cy="0"/>
+          <a:chOff x="0" y="0"/>
+          <a:chExt cx="0" cy="0"/>
+        </a:xfrm>
+      </p:grpSpPr>
+      <p:sp>
+        <p:nvSpPr>
+          <p:cNvPr id="2" name="Title 1"/>
+          <p:cNvSpPr>
+            <a:spLocks noGrp="1"/>
+          </p:cNvSpPr>
+          <p:nvPr>
+            <p:ph type="title"/>
+          </p:nvPr>
+        </p:nvSpPr>
+        <p:spPr>
+          <a:xfrm>
+            <a:off x="1945201" y="223935"/>
+            <a:ext cx="6589199" cy="838248"/>
+          </a:xfrm>
+        </p:spPr>
+        <p:txBody>
+          <a:bodyPr>
+            <a:normAutofit fontScale="90000"/>
+          </a:bodyPr>
+          <a:lstStyle/>
+          <a:p>
+            <a:r>
+              <a:rPr lang="en-US" sz="2800" b="1" dirty="0" smtClean="0"/>
+              <a:t>Results and findings:</a:t>
+            </a:r>
+            <a:r>
+              <a:rPr lang="en-US" sz="2800" b="1" dirty="0"/>
+              <a:t/>
+            </a:r>
+            <a:br>
+              <a:rPr lang="en-US" sz="2800" b="1" dirty="0"/>
+            </a:br>
+            <a:r>
+              <a:rPr sz="2800" dirty="0" smtClean="0"/>
+              <a:t>Regression Results</a:t>
+            </a:r>
+            <a:r>
+              <a:rPr lang="en-US" sz="2800" dirty="0" smtClean="0"/>
+              <a:t>.</a:t>
+            </a:r>
+            <a:r>
+              <a:rPr lang="en-US" sz="2800" b="1" dirty="0" smtClean="0"/>
+              <a:t/>
+            </a:r>
+            <a:br>
+              <a:rPr lang="en-US" sz="2800" b="1" dirty="0" smtClean="0"/>
+            </a:br>
+            <a:r>
+              <a:rPr lang="en-US" sz="2800" b="1" dirty="0"/>
+              <a:t/>
+            </a:r>
+            <a:br>
+              <a:rPr lang="en-US" sz="2800" b="1" dirty="0"/>
+            </a:br>
+            <a:endParaRPr sz="2800" b="1" dirty="0"/>
+          </a:p>
+        </p:txBody>
+      </p:sp>
+      <p:sp>
+        <p:nvSpPr>
+          <p:cNvPr id="5" name="Content Placeholder 4"/>
+          <p:cNvSpPr>
+            <a:spLocks noGrp="1"/>
+          </p:cNvSpPr>
+          <p:nvPr>
+            <p:ph idx="1"/>
+          </p:nvPr>
+        </p:nvSpPr>
+        <p:spPr>
+          <a:xfrm>
+            <a:off x="1339273" y="1062183"/>
+            <a:ext cx="7656945" cy="5708071"/>
+          </a:xfrm>
+        </p:spPr>
+        <p:txBody>
+          <a:bodyPr/>
+          <a:lstStyle/>
+          <a:p>
+            <a:r>
+              <a:rPr lang="en-US" dirty="0"/>
+              <a:t>To explore this, we used ROI as the target variable and production budget as the predictor. We applied a simple linear regression model to examine the relationship and evaluated its performance using R² and Mean Square Error (MSE</a:t>
+            </a:r>
+            <a:r>
+              <a:rPr lang="en-US" dirty="0" smtClean="0"/>
+              <a:t>)</a:t>
+            </a:r>
+          </a:p>
+          <a:p>
+            <a:endParaRPr lang="en-US" sz="1400" dirty="0" smtClean="0"/>
+          </a:p>
+          <a:p>
+            <a:endParaRPr lang="en-US" sz="1400" dirty="0"/>
+          </a:p>
+          <a:p>
+            <a:endParaRPr lang="en-US" sz="1400" dirty="0" smtClean="0"/>
+          </a:p>
+          <a:p>
+            <a:endParaRPr lang="en-US" sz="1400" dirty="0" smtClean="0"/>
+          </a:p>
+          <a:p>
+            <a:endParaRPr lang="en-US" sz="1400" dirty="0"/>
+          </a:p>
+          <a:p>
+            <a:endParaRPr lang="en-US" sz="1400" dirty="0" smtClean="0"/>
+          </a:p>
+          <a:p>
+            <a:endParaRPr lang="en-US" sz="1400" dirty="0"/>
+          </a:p>
+          <a:p>
+            <a:endParaRPr lang="en-US" sz="1400" dirty="0" smtClean="0"/>
+          </a:p>
+          <a:p>
+            <a:endParaRPr lang="en-US" sz="1400" dirty="0" smtClean="0"/>
+          </a:p>
+          <a:p>
+            <a:endParaRPr lang="en-US" sz="1400" dirty="0"/>
+          </a:p>
+        </p:txBody>
+      </p:sp>
+      <p:pic>
+        <p:nvPicPr>
+          <p:cNvPr id="9" name="Picture 8"/>
+          <p:cNvPicPr>
+            <a:picLocks noChangeAspect="1"/>
+          </p:cNvPicPr>
+          <p:nvPr/>
+        </p:nvPicPr>
+        <p:blipFill>
+          <a:blip r:embed="rId2"/>
+          <a:stretch>
+            <a:fillRect/>
+          </a:stretch>
+        </p:blipFill>
+        <p:spPr>
+          <a:xfrm>
+            <a:off x="1945201" y="2352793"/>
+            <a:ext cx="5553075" cy="4314825"/>
+          </a:xfrm>
+          <a:prstGeom prst="rect">
+            <a:avLst/>
+          </a:prstGeom>
+        </p:spPr>
+      </p:pic>
+    </p:spTree>
+  </p:cSld>
+  <p:clrMapOvr>
+    <a:masterClrMapping/>
+  </p:clrMapOvr>
+</p:sld>
+</file>
+
+<file path=ppt/slides/slide17.xml><?xml version="1.0" encoding="utf-8"?>
+<p:sld xmlns:a="http://schemas.openxmlformats.org/drawingml/2006/main" xmlns:r="http://schemas.openxmlformats.org/officeDocument/2006/relationships" xmlns:p="http://schemas.openxmlformats.org/presentationml/2006/main">
+  <p:cSld>
+    <p:spTree>
+      <p:nvGrpSpPr>
+        <p:cNvPr id="1" name=""/>
+        <p:cNvGrpSpPr/>
+        <p:nvPr/>
+      </p:nvGrpSpPr>
+      <p:grpSpPr>
+        <a:xfrm>
+          <a:off x="0" y="0"/>
+          <a:ext cx="0" cy="0"/>
+          <a:chOff x="0" y="0"/>
+          <a:chExt cx="0" cy="0"/>
+        </a:xfrm>
+      </p:grpSpPr>
+      <p:sp>
+        <p:nvSpPr>
+          <p:cNvPr id="2" name="Rectangle 1"/>
+          <p:cNvSpPr/>
+          <p:nvPr/>
+        </p:nvSpPr>
+        <p:spPr>
+          <a:xfrm>
+            <a:off x="1671782" y="1028343"/>
+            <a:ext cx="6548582" cy="5078313"/>
+          </a:xfrm>
+          <a:prstGeom prst="rect">
+            <a:avLst/>
+          </a:prstGeom>
+        </p:spPr>
+        <p:txBody>
+          <a:bodyPr wrap="square">
+            <a:spAutoFit/>
+          </a:bodyPr>
+          <a:lstStyle/>
+          <a:p>
+            <a:r>
+              <a:rPr lang="en-US" dirty="0" smtClean="0"/>
+              <a:t>Regression </a:t>
+            </a:r>
+            <a:r>
+              <a:rPr lang="en-US" dirty="0" err="1" smtClean="0"/>
+              <a:t>contd</a:t>
+            </a:r>
+            <a:r>
+              <a:rPr lang="en-US" dirty="0" smtClean="0"/>
+              <a:t>…</a:t>
+            </a:r>
+          </a:p>
+          <a:p>
+            <a:endParaRPr lang="en-US" dirty="0" smtClean="0"/>
+          </a:p>
+          <a:p>
+            <a:pPr marL="285750" indent="-285750">
+              <a:buFont typeface="Arial" panose="020B0604020202020204" pitchFamily="34" charset="0"/>
+              <a:buChar char="•"/>
             </a:pPr>
             <a:r>
-              <a:rPr lang="en-US" sz="2000" dirty="0" smtClean="0"/>
-              <a:t>Elizabeth Ogutu</a:t>
-            </a:r>
-          </a:p>
-          <a:p>
-            <a:pPr marL="0" indent="0">
-              <a:buNone/>
+              <a:rPr lang="en-US" dirty="0" smtClean="0"/>
+              <a:t>The </a:t>
+            </a:r>
+            <a:r>
+              <a:rPr lang="en-US" dirty="0"/>
+              <a:t>model shows that production budget alone has almost no predictive power for a movie’s ROI (R² = 0.0069), meaning we can’t reliably estimate profitability just from how much was spent on production. </a:t>
+            </a:r>
+            <a:endParaRPr lang="en-US" dirty="0" smtClean="0"/>
+          </a:p>
+          <a:p>
+            <a:pPr marL="285750" indent="-285750">
+              <a:buFont typeface="Arial" panose="020B0604020202020204" pitchFamily="34" charset="0"/>
+              <a:buChar char="•"/>
             </a:pPr>
-            <a:endParaRPr lang="en-US" sz="2000" dirty="0"/>
-          </a:p>
-          <a:p>
-            <a:pPr marL="0" indent="0">
-              <a:buNone/>
+            <a:endParaRPr lang="en-US" dirty="0"/>
+          </a:p>
+          <a:p>
+            <a:pPr marL="285750" indent="-285750">
+              <a:buFont typeface="Arial" panose="020B0604020202020204" pitchFamily="34" charset="0"/>
+              <a:buChar char="•"/>
             </a:pPr>
             <a:r>
-              <a:rPr lang="en-US" sz="2000" dirty="0"/>
+              <a:rPr lang="en-US" dirty="0" smtClean="0"/>
+              <a:t>This </a:t>
+            </a:r>
+            <a:r>
+              <a:rPr lang="en-US" dirty="0"/>
+              <a:t>weak relationship highlights a key limitation: production budgets typically exclude other critical financial factors such as marketing expenses, cinema or streaming platform cuts, and backend deals. </a:t>
+            </a:r>
+            <a:endParaRPr lang="en-US" dirty="0" smtClean="0"/>
+          </a:p>
+          <a:p>
+            <a:pPr marL="285750" indent="-285750">
+              <a:buFont typeface="Arial" panose="020B0604020202020204" pitchFamily="34" charset="0"/>
+              <a:buChar char="•"/>
+            </a:pPr>
+            <a:endParaRPr lang="en-US" dirty="0"/>
+          </a:p>
+          <a:p>
+            <a:pPr marL="285750" indent="-285750">
+              <a:buFont typeface="Arial" panose="020B0604020202020204" pitchFamily="34" charset="0"/>
+              <a:buChar char="•"/>
+            </a:pPr>
+            <a:r>
+              <a:rPr lang="en-US" dirty="0" smtClean="0"/>
+              <a:t>Simply </a:t>
+            </a:r>
+            <a:r>
+              <a:rPr lang="en-US" dirty="0"/>
+              <a:t>spending more on production doesn’t guarantee higher returns. To make better predictions, we would likely need a broader range of data that captures the full financial picture of a movie’s lifecycle.</a:t>
+            </a:r>
+          </a:p>
+        </p:txBody>
+      </p:sp>
+    </p:spTree>
+    <p:extLst>
+      <p:ext uri="{BB962C8B-B14F-4D97-AF65-F5344CB8AC3E}">
+        <p14:creationId xmlns:p14="http://schemas.microsoft.com/office/powerpoint/2010/main" val="2669520641"/>
+      </p:ext>
+    </p:extLst>
+  </p:cSld>
+  <p:clrMapOvr>
+    <a:masterClrMapping/>
+  </p:clrMapOvr>
+</p:sld>
+</file>
+
+<file path=ppt/slides/slide18.xml><?xml version="1.0" encoding="utf-8"?>
+<p:sld xmlns:a="http://schemas.openxmlformats.org/drawingml/2006/main" xmlns:r="http://schemas.openxmlformats.org/officeDocument/2006/relationships" xmlns:p="http://schemas.openxmlformats.org/presentationml/2006/main">
+  <p:cSld>
+    <p:spTree>
+      <p:nvGrpSpPr>
+        <p:cNvPr id="1" name=""/>
+        <p:cNvGrpSpPr/>
+        <p:nvPr/>
+      </p:nvGrpSpPr>
+      <p:grpSpPr>
+        <a:xfrm>
+          <a:off x="0" y="0"/>
+          <a:ext cx="0" cy="0"/>
+          <a:chOff x="0" y="0"/>
+          <a:chExt cx="0" cy="0"/>
+        </a:xfrm>
+      </p:grpSpPr>
+      <p:sp>
+        <p:nvSpPr>
+          <p:cNvPr id="2" name="Title 1"/>
+          <p:cNvSpPr>
+            <a:spLocks noGrp="1"/>
+          </p:cNvSpPr>
+          <p:nvPr>
+            <p:ph type="title"/>
+          </p:nvPr>
+        </p:nvSpPr>
+        <p:spPr>
+          <a:xfrm>
+            <a:off x="1945201" y="624110"/>
+            <a:ext cx="6589199" cy="742872"/>
+          </a:xfrm>
+        </p:spPr>
+        <p:txBody>
+          <a:bodyPr>
+            <a:normAutofit/>
+          </a:bodyPr>
+          <a:lstStyle/>
+          <a:p>
+            <a:r>
+              <a:rPr sz="2800" b="1" dirty="0" smtClean="0"/>
+              <a:t>Recommendations</a:t>
+            </a:r>
+            <a:r>
+              <a:rPr lang="en-US" sz="2800" b="1" dirty="0" smtClean="0"/>
+              <a:t>.</a:t>
+            </a:r>
+            <a:endParaRPr sz="2800" b="1" dirty="0"/>
+          </a:p>
+        </p:txBody>
+      </p:sp>
+      <p:sp>
+        <p:nvSpPr>
+          <p:cNvPr id="3" name="Content Placeholder 2"/>
+          <p:cNvSpPr>
+            <a:spLocks noGrp="1"/>
+          </p:cNvSpPr>
+          <p:nvPr>
+            <p:ph idx="1"/>
+          </p:nvPr>
+        </p:nvSpPr>
+        <p:spPr>
+          <a:xfrm>
+            <a:off x="1942415" y="1505527"/>
+            <a:ext cx="6591985" cy="4405695"/>
+          </a:xfrm>
+        </p:spPr>
+        <p:txBody>
+          <a:bodyPr/>
+          <a:lstStyle/>
+          <a:p>
+            <a:r>
+              <a:rPr dirty="0" smtClean="0"/>
+              <a:t>Focus </a:t>
+            </a:r>
+            <a:r>
+              <a:rPr dirty="0"/>
+              <a:t>on producing Action, Adventure, and Fantasy films.</a:t>
+            </a:r>
+          </a:p>
+          <a:p>
+            <a:r>
+              <a:rPr dirty="0" smtClean="0"/>
+              <a:t>Prioritize </a:t>
+            </a:r>
+            <a:r>
+              <a:rPr dirty="0"/>
+              <a:t>stories that resonate globally and generate online engagement.</a:t>
+            </a:r>
+          </a:p>
+          <a:p>
+            <a:r>
+              <a:rPr dirty="0" smtClean="0"/>
+              <a:t>Consider </a:t>
+            </a:r>
+            <a:r>
+              <a:rPr dirty="0"/>
+              <a:t>genres that maintain consistent viewer ratings</a:t>
+            </a:r>
+            <a:r>
+              <a:rPr dirty="0" smtClean="0"/>
+              <a:t>.</a:t>
+            </a:r>
+            <a:endParaRPr lang="en-US" dirty="0" smtClean="0"/>
+          </a:p>
+          <a:p>
+            <a:r>
+              <a:rPr lang="en-US" dirty="0"/>
+              <a:t>Boost vote count through marketing campaigns, early fan screenings, and </a:t>
+            </a:r>
+            <a:r>
+              <a:rPr lang="en-US" dirty="0" smtClean="0"/>
+              <a:t>sequels.</a:t>
+            </a:r>
+          </a:p>
+          <a:p>
+            <a:r>
+              <a:rPr lang="en-US" dirty="0" smtClean="0"/>
+              <a:t>Leverage </a:t>
+            </a:r>
+            <a:r>
+              <a:rPr lang="en-US" dirty="0"/>
+              <a:t>genre-specific tones and storytelling to match audience preferences</a:t>
+            </a:r>
+          </a:p>
+          <a:p>
+            <a:endParaRPr dirty="0"/>
+          </a:p>
+        </p:txBody>
+      </p:sp>
+    </p:spTree>
+  </p:cSld>
+  <p:clrMapOvr>
+    <a:masterClrMapping/>
+  </p:clrMapOvr>
+</p:sld>
+</file>
+
+<file path=ppt/slides/slide19.xml><?xml version="1.0" encoding="utf-8"?>
+<p:sld xmlns:a="http://schemas.openxmlformats.org/drawingml/2006/main" xmlns:r="http://schemas.openxmlformats.org/officeDocument/2006/relationships" xmlns:p="http://schemas.openxmlformats.org/presentationml/2006/main">
+  <p:cSld>
+    <p:spTree>
+      <p:nvGrpSpPr>
+        <p:cNvPr id="1" name=""/>
+        <p:cNvGrpSpPr/>
+        <p:nvPr/>
+      </p:nvGrpSpPr>
+      <p:grpSpPr>
+        <a:xfrm>
+          <a:off x="0" y="0"/>
+          <a:ext cx="0" cy="0"/>
+          <a:chOff x="0" y="0"/>
+          <a:chExt cx="0" cy="0"/>
+        </a:xfrm>
+      </p:grpSpPr>
+      <p:sp>
+        <p:nvSpPr>
+          <p:cNvPr id="2" name="Title 1"/>
+          <p:cNvSpPr>
+            <a:spLocks noGrp="1"/>
+          </p:cNvSpPr>
+          <p:nvPr>
+            <p:ph type="title"/>
+          </p:nvPr>
+        </p:nvSpPr>
+        <p:spPr>
+          <a:xfrm>
+            <a:off x="1945201" y="624110"/>
+            <a:ext cx="6589199" cy="807526"/>
+          </a:xfrm>
+        </p:spPr>
+        <p:txBody>
+          <a:bodyPr>
+            <a:normAutofit/>
+          </a:bodyPr>
+          <a:lstStyle/>
+          <a:p>
+            <a:r>
+              <a:rPr sz="2800" b="1" dirty="0"/>
+              <a:t>Next Steps</a:t>
+            </a:r>
+          </a:p>
+        </p:txBody>
+      </p:sp>
+      <p:sp>
+        <p:nvSpPr>
+          <p:cNvPr id="3" name="Content Placeholder 2"/>
+          <p:cNvSpPr>
+            <a:spLocks noGrp="1"/>
+          </p:cNvSpPr>
+          <p:nvPr>
+            <p:ph idx="1"/>
+          </p:nvPr>
+        </p:nvSpPr>
+        <p:spPr>
+          <a:xfrm>
+            <a:off x="1942415" y="1431636"/>
+            <a:ext cx="6591985" cy="4479586"/>
+          </a:xfrm>
+        </p:spPr>
+        <p:txBody>
+          <a:bodyPr/>
+          <a:lstStyle/>
+          <a:p>
+            <a:r>
+              <a:rPr dirty="0" smtClean="0"/>
+              <a:t>Conduct </a:t>
+            </a:r>
+            <a:r>
+              <a:rPr dirty="0"/>
+              <a:t>deeper modeling to predict box office revenue.</a:t>
+            </a:r>
+          </a:p>
+          <a:p>
+            <a:r>
+              <a:rPr dirty="0" smtClean="0"/>
+              <a:t>Integrate </a:t>
+            </a:r>
+            <a:r>
+              <a:rPr dirty="0"/>
+              <a:t>marketing and budget data for richer insights.</a:t>
+            </a:r>
+          </a:p>
+          <a:p>
+            <a:r>
+              <a:rPr dirty="0" smtClean="0"/>
+              <a:t>Test </a:t>
+            </a:r>
+            <a:r>
+              <a:rPr dirty="0"/>
+              <a:t>concepts with focus groups aligned with top genres</a:t>
+            </a:r>
+            <a:r>
+              <a:rPr dirty="0" smtClean="0"/>
+              <a:t>.</a:t>
+            </a:r>
+            <a:r>
+              <a:rPr lang="en-US" dirty="0"/>
               <a:t> </a:t>
             </a:r>
-            <a:r>
-              <a:rPr lang="en-US" sz="2000" dirty="0" smtClean="0"/>
-              <a:t>                                  </a:t>
-            </a:r>
-            <a:r>
-              <a:rPr lang="en-US" sz="2000" b="1" dirty="0" smtClean="0"/>
-              <a:t>Thank you!</a:t>
-            </a:r>
-            <a:endParaRPr sz="2000" b="1" dirty="0"/>
+            <a:endParaRPr lang="en-US" dirty="0" smtClean="0"/>
+          </a:p>
+          <a:p>
+            <a:r>
+              <a:rPr lang="en-US" dirty="0" smtClean="0"/>
+              <a:t>Conduct </a:t>
+            </a:r>
+            <a:r>
+              <a:rPr lang="en-US" dirty="0"/>
+              <a:t>deeper analysis into </a:t>
+            </a:r>
+            <a:r>
+              <a:rPr lang="en-US" b="1" dirty="0"/>
+              <a:t>budget vs return</a:t>
+            </a:r>
+            <a:r>
+              <a:rPr lang="en-US" dirty="0"/>
+              <a:t> per genre</a:t>
+            </a:r>
+          </a:p>
+          <a:p>
+            <a:r>
+              <a:rPr lang="en-US" dirty="0"/>
+              <a:t>Analyze </a:t>
+            </a:r>
+            <a:r>
+              <a:rPr lang="en-US" b="1" dirty="0"/>
+              <a:t>international markets</a:t>
+            </a:r>
+            <a:r>
+              <a:rPr lang="en-US" dirty="0"/>
+              <a:t> to align global preferences</a:t>
+            </a:r>
+          </a:p>
+          <a:p>
+            <a:r>
+              <a:rPr lang="en-US" dirty="0"/>
+              <a:t>Incorporate </a:t>
+            </a:r>
+            <a:r>
+              <a:rPr lang="en-US" b="1" dirty="0"/>
+              <a:t>text sentiment</a:t>
+            </a:r>
+            <a:r>
+              <a:rPr lang="en-US" dirty="0"/>
+              <a:t> from reviews to refine tone/style recommendations</a:t>
+            </a:r>
+          </a:p>
+          <a:p>
+            <a:endParaRPr dirty="0"/>
           </a:p>
         </p:txBody>
       </p:sp>
@@ -8032,9 +9308,14 @@
           <a:lstStyle/>
           <a:p>
             <a:r>
-              <a:rPr sz="2800" b="1" dirty="0"/>
-              <a:t>Business Problem</a:t>
-            </a:r>
+              <a:rPr sz="2800" b="1" dirty="0" smtClean="0"/>
+              <a:t>Problem</a:t>
+            </a:r>
+            <a:r>
+              <a:rPr lang="en-US" sz="2800" b="1" dirty="0" smtClean="0"/>
+              <a:t> statement.</a:t>
+            </a:r>
+            <a:endParaRPr sz="2800" b="1" dirty="0"/>
           </a:p>
         </p:txBody>
       </p:sp>
@@ -8050,45 +9331,236 @@
         </p:nvSpPr>
         <p:spPr>
           <a:xfrm>
-            <a:off x="1942415" y="1403928"/>
-            <a:ext cx="6591985" cy="3297382"/>
+            <a:off x="1866123" y="1579418"/>
+            <a:ext cx="6668278" cy="3121891"/>
           </a:xfrm>
         </p:spPr>
         <p:txBody>
-          <a:bodyPr/>
+          <a:bodyPr>
+            <a:normAutofit/>
+          </a:bodyPr>
           <a:lstStyle/>
           <a:p>
             <a:pPr marL="0" indent="0">
               <a:buNone/>
             </a:pPr>
             <a:r>
-              <a:rPr lang="en-US" dirty="0"/>
+              <a:rPr lang="en-US" sz="2000" dirty="0"/>
               <a:t>The new movie studio lacks experience in filmmaking and needs insights to:</a:t>
             </a:r>
           </a:p>
           <a:p>
             <a:r>
-              <a:rPr lang="en-US" dirty="0"/>
+              <a:rPr lang="en-US" sz="2000" dirty="0"/>
               <a:t>Identify successful movie characteristics.</a:t>
             </a:r>
           </a:p>
           <a:p>
             <a:r>
-              <a:rPr lang="en-US" dirty="0"/>
+              <a:rPr lang="en-US" sz="2000" dirty="0"/>
               <a:t>Pinpoint profitable genres.</a:t>
             </a:r>
           </a:p>
           <a:p>
             <a:r>
-              <a:rPr lang="en-US" dirty="0"/>
+              <a:rPr lang="en-US" sz="2000" dirty="0"/>
               <a:t>Determine optimal budget ranges.</a:t>
             </a:r>
           </a:p>
           <a:p>
             <a:r>
-              <a:rPr lang="en-US" dirty="0"/>
+              <a:rPr lang="en-US" sz="2000" dirty="0"/>
               <a:t>Strategize release timings to maximize box office revenue.</a:t>
             </a:r>
+          </a:p>
+        </p:txBody>
+      </p:sp>
+    </p:spTree>
+  </p:cSld>
+  <p:clrMapOvr>
+    <a:masterClrMapping/>
+  </p:clrMapOvr>
+</p:sld>
+</file>
+
+<file path=ppt/slides/slide20.xml><?xml version="1.0" encoding="utf-8"?>
+<p:sld xmlns:a="http://schemas.openxmlformats.org/drawingml/2006/main" xmlns:r="http://schemas.openxmlformats.org/officeDocument/2006/relationships" xmlns:p="http://schemas.openxmlformats.org/presentationml/2006/main">
+  <p:cSld>
+    <p:spTree>
+      <p:nvGrpSpPr>
+        <p:cNvPr id="1" name=""/>
+        <p:cNvGrpSpPr/>
+        <p:nvPr/>
+      </p:nvGrpSpPr>
+      <p:grpSpPr>
+        <a:xfrm>
+          <a:off x="0" y="0"/>
+          <a:ext cx="0" cy="0"/>
+          <a:chOff x="0" y="0"/>
+          <a:chExt cx="0" cy="0"/>
+        </a:xfrm>
+      </p:grpSpPr>
+      <p:sp>
+        <p:nvSpPr>
+          <p:cNvPr id="2" name="Title 1"/>
+          <p:cNvSpPr>
+            <a:spLocks noGrp="1"/>
+          </p:cNvSpPr>
+          <p:nvPr>
+            <p:ph type="title"/>
+          </p:nvPr>
+        </p:nvSpPr>
+        <p:spPr>
+          <a:xfrm>
+            <a:off x="1945201" y="624110"/>
+            <a:ext cx="6589199" cy="724399"/>
+          </a:xfrm>
+        </p:spPr>
+        <p:txBody>
+          <a:bodyPr>
+            <a:normAutofit/>
+          </a:bodyPr>
+          <a:lstStyle/>
+          <a:p>
+            <a:r>
+              <a:rPr lang="en-US" sz="2800" b="1" dirty="0" smtClean="0"/>
+              <a:t> </a:t>
+            </a:r>
+            <a:r>
+              <a:rPr sz="2800" b="1" dirty="0" smtClean="0"/>
+              <a:t>Q&amp;A </a:t>
+            </a:r>
+            <a:r>
+              <a:rPr sz="2800" b="1" dirty="0"/>
+              <a:t>/ Conclusion</a:t>
+            </a:r>
+          </a:p>
+        </p:txBody>
+      </p:sp>
+      <p:sp>
+        <p:nvSpPr>
+          <p:cNvPr id="3" name="Content Placeholder 2"/>
+          <p:cNvSpPr>
+            <a:spLocks noGrp="1"/>
+          </p:cNvSpPr>
+          <p:nvPr>
+            <p:ph idx="1"/>
+          </p:nvPr>
+        </p:nvSpPr>
+        <p:spPr>
+          <a:xfrm>
+            <a:off x="1754155" y="1268963"/>
+            <a:ext cx="6780245" cy="4642259"/>
+          </a:xfrm>
+        </p:spPr>
+        <p:txBody>
+          <a:bodyPr>
+            <a:noAutofit/>
+          </a:bodyPr>
+          <a:lstStyle/>
+          <a:p>
+            <a:endParaRPr lang="en-US" sz="2000" dirty="0" smtClean="0"/>
+          </a:p>
+          <a:p>
+            <a:r>
+              <a:rPr lang="en-US" sz="2000" b="1" dirty="0"/>
+              <a:t>Conclusion:</a:t>
+            </a:r>
+            <a:r>
+              <a:rPr lang="en-US" sz="2000" dirty="0"/>
+              <a:t> Data supports a clear strategic focus on Adventure, Action, and Fantasy. These genres offer consistent popularity, high audience engagement, and room for creative expansion</a:t>
+            </a:r>
+            <a:r>
+              <a:rPr lang="en-US" sz="2000" dirty="0" smtClean="0"/>
+              <a:t>.</a:t>
+            </a:r>
+          </a:p>
+          <a:p>
+            <a:pPr marL="0" indent="0">
+              <a:buNone/>
+            </a:pPr>
+            <a:r>
+              <a:rPr lang="en-US" sz="2000" b="1" dirty="0" smtClean="0"/>
+              <a:t>Authors</a:t>
+            </a:r>
+            <a:endParaRPr lang="en-US" sz="2000" b="1" dirty="0" smtClean="0"/>
+          </a:p>
+          <a:p>
+            <a:pPr marL="0" indent="0">
+              <a:buNone/>
+            </a:pPr>
+            <a:r>
+              <a:rPr lang="en-US" sz="2000" dirty="0" err="1" smtClean="0"/>
+              <a:t>Hafsa</a:t>
+            </a:r>
+            <a:r>
+              <a:rPr lang="en-US" sz="2000" dirty="0" smtClean="0"/>
+              <a:t> Mohammed</a:t>
+            </a:r>
+          </a:p>
+          <a:p>
+            <a:pPr marL="0" indent="0">
+              <a:buNone/>
+            </a:pPr>
+            <a:r>
+              <a:rPr lang="en-US" sz="2000" dirty="0" smtClean="0"/>
+              <a:t>Ryan </a:t>
+            </a:r>
+            <a:r>
+              <a:rPr lang="en-US" sz="2000" dirty="0" err="1" smtClean="0"/>
+              <a:t>Karimi</a:t>
+            </a:r>
+            <a:endParaRPr lang="en-US" sz="2000" dirty="0" smtClean="0"/>
+          </a:p>
+          <a:p>
+            <a:pPr marL="0" indent="0">
+              <a:buNone/>
+            </a:pPr>
+            <a:r>
+              <a:rPr lang="en-US" sz="2000" dirty="0" smtClean="0"/>
+              <a:t>Rose </a:t>
+            </a:r>
+            <a:r>
+              <a:rPr lang="en-US" sz="2000" dirty="0" err="1" smtClean="0"/>
+              <a:t>Muthini</a:t>
+            </a:r>
+            <a:endParaRPr lang="en-US" sz="2000" dirty="0" smtClean="0"/>
+          </a:p>
+          <a:p>
+            <a:pPr marL="0" indent="0">
+              <a:buNone/>
+            </a:pPr>
+            <a:r>
+              <a:rPr lang="en-US" sz="2000" dirty="0" smtClean="0"/>
+              <a:t>Elizabeth </a:t>
+            </a:r>
+            <a:r>
+              <a:rPr lang="en-US" sz="2000" dirty="0" smtClean="0"/>
+              <a:t>Ogutu</a:t>
+            </a:r>
+            <a:endParaRPr lang="en-US" sz="2000" dirty="0"/>
+          </a:p>
+          <a:p>
+            <a:pPr marL="0" indent="0">
+              <a:buNone/>
+            </a:pPr>
+            <a:r>
+              <a:rPr lang="en-US" sz="2000" dirty="0"/>
+              <a:t> </a:t>
+            </a:r>
+            <a:r>
+              <a:rPr lang="en-US" sz="2000" dirty="0" smtClean="0"/>
+              <a:t>                                  </a:t>
+            </a:r>
+            <a:r>
+              <a:rPr lang="en-US" sz="2000" b="1" dirty="0" smtClean="0"/>
+              <a:t>Thank </a:t>
+            </a:r>
+            <a:r>
+              <a:rPr lang="en-US" sz="2000" b="1" dirty="0" smtClean="0"/>
+              <a:t>you</a:t>
+            </a:r>
+            <a:endParaRPr sz="2000" b="1" dirty="0"/>
           </a:p>
         </p:txBody>
       </p:sp>
@@ -8141,7 +9613,11 @@
           <a:p>
             <a:r>
               <a:rPr lang="en-US" sz="3100" b="1" dirty="0"/>
-              <a:t>Data Understanding</a:t>
+              <a:t>Data </a:t>
+            </a:r>
+            <a:r>
+              <a:rPr lang="en-US" sz="3100" b="1" dirty="0" smtClean="0"/>
+              <a:t>Understanding.</a:t>
             </a:r>
             <a:r>
               <a:rPr lang="en-US" b="1" dirty="0"/>
@@ -8471,39 +9947,61 @@
         <p:spPr/>
         <p:txBody>
           <a:bodyPr>
-            <a:normAutofit/>
+            <a:normAutofit fontScale="90000"/>
           </a:bodyPr>
           <a:lstStyle/>
           <a:p>
             <a:r>
+              <a:rPr lang="en-US" sz="2800" b="1" dirty="0" smtClean="0"/>
+              <a:t>Results and findings: </a:t>
+            </a:r>
+            <a:br>
+              <a:rPr lang="en-US" sz="2800" b="1" dirty="0" smtClean="0"/>
+            </a:br>
+            <a:r>
+              <a:rPr lang="en-US" sz="2800" b="1" dirty="0"/>
+              <a:t/>
+            </a:r>
+            <a:br>
+              <a:rPr lang="en-US" sz="2800" b="1" dirty="0"/>
+            </a:br>
+            <a:r>
+              <a:rPr sz="2800" b="1" dirty="0" smtClean="0"/>
+              <a:t>Genre </a:t>
+            </a:r>
+            <a:r>
               <a:rPr sz="2800" b="1" dirty="0"/>
-              <a:t>EDA Insight 1: Genre Performance</a:t>
-            </a:r>
-          </a:p>
-        </p:txBody>
-      </p:sp>
-      <p:sp>
-        <p:nvSpPr>
-          <p:cNvPr id="3" name="Content Placeholder 2"/>
-          <p:cNvSpPr>
-            <a:spLocks noGrp="1"/>
-          </p:cNvSpPr>
+              <a:t>Performance</a:t>
+            </a:r>
+          </a:p>
+        </p:txBody>
+      </p:sp>
+      <p:pic>
+        <p:nvPicPr>
+          <p:cNvPr id="4" name="Content Placeholder 3"/>
+          <p:cNvPicPr>
+            <a:picLocks noGrp="1" noChangeAspect="1"/>
+          </p:cNvPicPr>
           <p:nvPr>
             <p:ph idx="1"/>
           </p:nvPr>
-        </p:nvSpPr>
-        <p:spPr/>
-        <p:txBody>
-          <a:bodyPr/>
-          <a:lstStyle/>
-          <a:p>
-            <a:r>
-              <a:rPr dirty="0"/>
-              <a:t>Adventure and Action genres consistently show high popularity and decent vote averages. Fantasy and Crime follow closely.</a:t>
-            </a:r>
-          </a:p>
-        </p:txBody>
-      </p:sp>
+        </p:nvPicPr>
+        <p:blipFill>
+          <a:blip r:embed="rId2"/>
+          <a:stretch>
+            <a:fillRect/>
+          </a:stretch>
+        </p:blipFill>
+        <p:spPr>
+          <a:xfrm>
+            <a:off x="1487056" y="1905000"/>
+            <a:ext cx="7213600" cy="4401355"/>
+          </a:xfrm>
+          <a:prstGeom prst="rect">
+            <a:avLst/>
+          </a:prstGeom>
+        </p:spPr>
+      </p:pic>
     </p:spTree>
   </p:cSld>
   <p:clrMapOvr>
@@ -8531,51 +10029,184 @@
       </p:grpSpPr>
       <p:sp>
         <p:nvSpPr>
-          <p:cNvPr id="2" name="Title 1"/>
-          <p:cNvSpPr>
-            <a:spLocks noGrp="1"/>
-          </p:cNvSpPr>
-          <p:nvPr>
-            <p:ph type="title"/>
-          </p:nvPr>
-        </p:nvSpPr>
-        <p:spPr/>
-        <p:txBody>
-          <a:bodyPr>
-            <a:normAutofit/>
+          <p:cNvPr id="2" name="Rectangle 1"/>
+          <p:cNvSpPr/>
+          <p:nvPr/>
+        </p:nvSpPr>
+        <p:spPr>
+          <a:xfrm>
+            <a:off x="988291" y="751344"/>
+            <a:ext cx="8035636" cy="5632311"/>
+          </a:xfrm>
+          <a:prstGeom prst="rect">
+            <a:avLst/>
+          </a:prstGeom>
+        </p:spPr>
+        <p:txBody>
+          <a:bodyPr wrap="square">
+            <a:spAutoFit/>
           </a:bodyPr>
           <a:lstStyle/>
           <a:p>
             <a:r>
-              <a:rPr sz="2800" dirty="0"/>
-              <a:t>EDA Insight 2: Release Year Trends</a:t>
-            </a:r>
-          </a:p>
-        </p:txBody>
-      </p:sp>
-      <p:sp>
-        <p:nvSpPr>
-          <p:cNvPr id="3" name="Content Placeholder 2"/>
-          <p:cNvSpPr>
-            <a:spLocks noGrp="1"/>
-          </p:cNvSpPr>
-          <p:nvPr>
-            <p:ph idx="1"/>
-          </p:nvPr>
-        </p:nvSpPr>
-        <p:spPr/>
-        <p:txBody>
-          <a:bodyPr/>
-          <a:lstStyle/>
-          <a:p>
-            <a:r>
-              <a:rPr dirty="0"/>
-              <a:t>More movies were released in the 2000s and 2010s. Successful films are not limited to recent years.</a:t>
+              <a:rPr lang="en-US" dirty="0" smtClean="0"/>
+              <a:t>Genre performance </a:t>
+            </a:r>
+            <a:r>
+              <a:rPr lang="en-US" dirty="0" err="1" smtClean="0"/>
+              <a:t>contd</a:t>
+            </a:r>
+            <a:r>
+              <a:rPr lang="en-US" dirty="0" smtClean="0"/>
+              <a:t>….</a:t>
+            </a:r>
+          </a:p>
+          <a:p>
+            <a:endParaRPr lang="en-US" b="1" dirty="0"/>
+          </a:p>
+          <a:p>
+            <a:r>
+              <a:rPr lang="en-US" b="1" dirty="0" smtClean="0"/>
+              <a:t>Top </a:t>
+            </a:r>
+            <a:r>
+              <a:rPr lang="en-US" b="1" dirty="0"/>
+              <a:t>Performing Genres (based on average statistics</a:t>
+            </a:r>
+            <a:r>
+              <a:rPr lang="en-US" b="1" dirty="0" smtClean="0"/>
+              <a:t>):</a:t>
+            </a:r>
+          </a:p>
+          <a:p>
+            <a:pPr marL="285750" indent="-285750">
+              <a:buFont typeface="Arial" panose="020B0604020202020204" pitchFamily="34" charset="0"/>
+              <a:buChar char="•"/>
+            </a:pPr>
+            <a:endParaRPr lang="en-US" dirty="0"/>
+          </a:p>
+          <a:p>
+            <a:pPr marL="285750" indent="-285750">
+              <a:buFont typeface="Arial" panose="020B0604020202020204" pitchFamily="34" charset="0"/>
+              <a:buChar char="•"/>
+            </a:pPr>
+            <a:r>
+              <a:rPr lang="en-US" dirty="0" smtClean="0"/>
+              <a:t>Action</a:t>
+            </a:r>
+            <a:r>
+              <a:rPr lang="en-US" dirty="0"/>
+              <a:t>: High popularity, moderate ratings (large audience but some mixed reception</a:t>
+            </a:r>
+            <a:r>
+              <a:rPr lang="en-US" dirty="0" smtClean="0"/>
+              <a:t>).</a:t>
+            </a:r>
+          </a:p>
+          <a:p>
+            <a:pPr marL="285750" indent="-285750">
+              <a:buFont typeface="Arial" panose="020B0604020202020204" pitchFamily="34" charset="0"/>
+              <a:buChar char="•"/>
+            </a:pPr>
+            <a:endParaRPr lang="en-US" dirty="0"/>
+          </a:p>
+          <a:p>
+            <a:pPr marL="285750" indent="-285750">
+              <a:buFont typeface="Arial" panose="020B0604020202020204" pitchFamily="34" charset="0"/>
+              <a:buChar char="•"/>
+            </a:pPr>
+            <a:r>
+              <a:rPr lang="en-US" dirty="0" smtClean="0"/>
+              <a:t>Fantasy</a:t>
+            </a:r>
+            <a:r>
+              <a:rPr lang="en-US" dirty="0"/>
+              <a:t>: Very high popularity and generally good ratings (attracts both mainstream and dedicated audiences</a:t>
+            </a:r>
+            <a:r>
+              <a:rPr lang="en-US" dirty="0" smtClean="0"/>
+              <a:t>).</a:t>
+            </a:r>
+          </a:p>
+          <a:p>
+            <a:pPr marL="285750" indent="-285750">
+              <a:buFont typeface="Arial" panose="020B0604020202020204" pitchFamily="34" charset="0"/>
+              <a:buChar char="•"/>
+            </a:pPr>
+            <a:endParaRPr lang="en-US" dirty="0"/>
+          </a:p>
+          <a:p>
+            <a:pPr marL="285750" indent="-285750">
+              <a:buFont typeface="Arial" panose="020B0604020202020204" pitchFamily="34" charset="0"/>
+              <a:buChar char="•"/>
+            </a:pPr>
+            <a:r>
+              <a:rPr lang="en-US" dirty="0" smtClean="0"/>
+              <a:t>Drama</a:t>
+            </a:r>
+            <a:r>
+              <a:rPr lang="en-US" dirty="0"/>
+              <a:t>: Strong ratings but lower popularity compared to Action/Fantasy</a:t>
+            </a:r>
+            <a:r>
+              <a:rPr lang="en-US" dirty="0" smtClean="0"/>
+              <a:t>.</a:t>
+            </a:r>
+          </a:p>
+          <a:p>
+            <a:pPr marL="285750" indent="-285750">
+              <a:buFont typeface="Arial" panose="020B0604020202020204" pitchFamily="34" charset="0"/>
+              <a:buChar char="•"/>
+            </a:pPr>
+            <a:endParaRPr lang="en-US" dirty="0"/>
+          </a:p>
+          <a:p>
+            <a:pPr marL="285750" indent="-285750">
+              <a:buFont typeface="Arial" panose="020B0604020202020204" pitchFamily="34" charset="0"/>
+              <a:buChar char="•"/>
+            </a:pPr>
+            <a:r>
+              <a:rPr lang="en-US" dirty="0" smtClean="0"/>
+              <a:t>Animation</a:t>
+            </a:r>
+            <a:r>
+              <a:rPr lang="en-US" dirty="0"/>
+              <a:t>: Very high ratings with moderate popularity — beloved by families and audiences seeking quality storytelling</a:t>
+            </a:r>
+            <a:r>
+              <a:rPr lang="en-US" dirty="0" smtClean="0"/>
+              <a:t>.</a:t>
+            </a:r>
+          </a:p>
+          <a:p>
+            <a:pPr marL="285750" indent="-285750">
+              <a:buFont typeface="Arial" panose="020B0604020202020204" pitchFamily="34" charset="0"/>
+              <a:buChar char="•"/>
+            </a:pPr>
+            <a:endParaRPr lang="en-US" dirty="0"/>
+          </a:p>
+          <a:p>
+            <a:pPr marL="285750" indent="-285750">
+              <a:buFont typeface="Arial" panose="020B0604020202020204" pitchFamily="34" charset="0"/>
+              <a:buChar char="•"/>
+            </a:pPr>
+            <a:r>
+              <a:rPr lang="en-US" dirty="0" smtClean="0"/>
+              <a:t>By </a:t>
+            </a:r>
+            <a:r>
+              <a:rPr lang="en-US" dirty="0"/>
+              <a:t>focusing on these top-performing genres, studios can optimize their content portfolio to maximize both audience engagement (popularity) and viewer satisfaction (ratings), ensuring both financial returns and critical acclaim.</a:t>
             </a:r>
           </a:p>
         </p:txBody>
       </p:sp>
     </p:spTree>
+    <p:extLst>
+      <p:ext uri="{BB962C8B-B14F-4D97-AF65-F5344CB8AC3E}">
+        <p14:creationId xmlns:p14="http://schemas.microsoft.com/office/powerpoint/2010/main" val="2755960450"/>
+      </p:ext>
+    </p:extLst>
   </p:cSld>
   <p:clrMapOvr>
     <a:masterClrMapping/>
@@ -8610,42 +10241,70 @@
             <p:ph type="title"/>
           </p:nvPr>
         </p:nvSpPr>
-        <p:spPr/>
+        <p:spPr>
+          <a:xfrm>
+            <a:off x="1945201" y="624110"/>
+            <a:ext cx="6764690" cy="644853"/>
+          </a:xfrm>
+        </p:spPr>
         <p:txBody>
           <a:bodyPr>
-            <a:normAutofit/>
+            <a:normAutofit fontScale="90000"/>
           </a:bodyPr>
           <a:lstStyle/>
           <a:p>
             <a:r>
-              <a:rPr sz="2800" dirty="0"/>
-              <a:t>EDA Insight 3: Audience Engagement</a:t>
-            </a:r>
-          </a:p>
-        </p:txBody>
-      </p:sp>
-      <p:sp>
-        <p:nvSpPr>
-          <p:cNvPr id="3" name="Content Placeholder 2"/>
-          <p:cNvSpPr>
-            <a:spLocks noGrp="1"/>
-          </p:cNvSpPr>
+              <a:rPr lang="en-US" sz="2800" b="1" dirty="0" smtClean="0"/>
+              <a:t>Results and findings:</a:t>
+            </a:r>
+            <a:r>
+              <a:rPr lang="en-US" sz="2800" dirty="0" smtClean="0"/>
+              <a:t/>
+            </a:r>
+            <a:br>
+              <a:rPr lang="en-US" sz="2800" dirty="0" smtClean="0"/>
+            </a:br>
+            <a:r>
+              <a:rPr lang="en-US" sz="2800" dirty="0" smtClean="0"/>
+              <a:t/>
+            </a:r>
+            <a:br>
+              <a:rPr lang="en-US" sz="2800" dirty="0" smtClean="0"/>
+            </a:br>
+            <a:r>
+              <a:rPr lang="en-US" sz="2800" dirty="0" smtClean="0"/>
+              <a:t>Genre pairs by combination success metrics (Vote average&amp; popularity)</a:t>
+            </a:r>
+            <a:endParaRPr sz="2800" dirty="0"/>
+          </a:p>
+        </p:txBody>
+      </p:sp>
+      <p:pic>
+        <p:nvPicPr>
+          <p:cNvPr id="6" name="Content Placeholder 5"/>
+          <p:cNvPicPr>
+            <a:picLocks noGrp="1" noChangeAspect="1"/>
+          </p:cNvPicPr>
           <p:nvPr>
             <p:ph idx="1"/>
           </p:nvPr>
-        </p:nvSpPr>
-        <p:spPr/>
-        <p:txBody>
-          <a:bodyPr/>
-          <a:lstStyle/>
-          <a:p>
-            <a:r>
-              <a:rPr dirty="0"/>
-              <a:t>Movies with high vote counts (like 'Inception' and 'Iron Man 2') indicate broader appeal and buzz among viewers.</a:t>
-            </a:r>
-          </a:p>
-        </p:txBody>
-      </p:sp>
+        </p:nvPicPr>
+        <p:blipFill>
+          <a:blip r:embed="rId2"/>
+          <a:stretch>
+            <a:fillRect/>
+          </a:stretch>
+        </p:blipFill>
+        <p:spPr>
+          <a:xfrm>
+            <a:off x="1604559" y="2503290"/>
+            <a:ext cx="6951518" cy="3948214"/>
+          </a:xfrm>
+          <a:prstGeom prst="rect">
+            <a:avLst/>
+          </a:prstGeom>
+        </p:spPr>
+      </p:pic>
     </p:spTree>
   </p:cSld>
   <p:clrMapOvr>
@@ -8673,65 +10332,119 @@
       </p:grpSpPr>
       <p:sp>
         <p:nvSpPr>
-          <p:cNvPr id="2" name="Title 1"/>
-          <p:cNvSpPr>
-            <a:spLocks noGrp="1"/>
-          </p:cNvSpPr>
-          <p:nvPr>
-            <p:ph type="title"/>
-          </p:nvPr>
-        </p:nvSpPr>
-        <p:spPr/>
-        <p:txBody>
-          <a:bodyPr>
-            <a:normAutofit/>
+          <p:cNvPr id="2" name="Rectangle 1"/>
+          <p:cNvSpPr/>
+          <p:nvPr/>
+        </p:nvSpPr>
+        <p:spPr>
+          <a:xfrm>
+            <a:off x="1487055" y="1720840"/>
+            <a:ext cx="7204363" cy="3139321"/>
+          </a:xfrm>
+          <a:prstGeom prst="rect">
+            <a:avLst/>
+          </a:prstGeom>
+        </p:spPr>
+        <p:txBody>
+          <a:bodyPr wrap="square">
+            <a:spAutoFit/>
           </a:bodyPr>
           <a:lstStyle/>
           <a:p>
-            <a:r>
-              <a:rPr sz="2800" b="1" dirty="0"/>
-              <a:t>Regression Results</a:t>
-            </a:r>
-          </a:p>
-        </p:txBody>
-      </p:sp>
-      <p:sp>
-        <p:nvSpPr>
-          <p:cNvPr id="3" name="Content Placeholder 2"/>
-          <p:cNvSpPr>
-            <a:spLocks noGrp="1"/>
-          </p:cNvSpPr>
-          <p:nvPr>
-            <p:ph idx="1"/>
-          </p:nvPr>
-        </p:nvSpPr>
-        <p:spPr/>
-        <p:txBody>
-          <a:bodyPr/>
-          <a:lstStyle/>
-          <a:p>
-            <a:r>
-              <a:rPr dirty="0"/>
-              <a:t>Regression analysis results can be placed here.</a:t>
-            </a:r>
-          </a:p>
-          <a:p>
-            <a:r>
-              <a:rPr dirty="0"/>
-              <a:t>Highlight predictors of popularity or </a:t>
-            </a:r>
-            <a:r>
-              <a:rPr dirty="0" err="1"/>
+            <a:pPr marL="342900" indent="-342900">
+              <a:buAutoNum type="arabicPeriod"/>
+            </a:pPr>
+            <a:r>
+              <a:rPr lang="en-US" dirty="0" smtClean="0"/>
+              <a:t>Top </a:t>
+            </a:r>
+            <a:r>
+              <a:rPr lang="en-US" dirty="0"/>
+              <a:t>Performer: Adventure &amp; Science Fiction is the top combo with a success metric of </a:t>
+            </a:r>
+            <a:r>
+              <a:rPr lang="en-US" dirty="0" smtClean="0"/>
+              <a:t>8.7</a:t>
+            </a:r>
+          </a:p>
+          <a:p>
+            <a:pPr marL="342900" indent="-342900">
+              <a:buAutoNum type="arabicPeriod"/>
+            </a:pPr>
+            <a:endParaRPr lang="en-US" dirty="0" smtClean="0"/>
+          </a:p>
+          <a:p>
+            <a:pPr marL="342900" indent="-342900">
+              <a:buAutoNum type="arabicPeriod"/>
+            </a:pPr>
+            <a:r>
+              <a:rPr lang="en-US" dirty="0" smtClean="0"/>
+              <a:t>2</a:t>
+            </a:r>
+            <a:r>
+              <a:rPr lang="en-US" dirty="0"/>
+              <a:t>. Adventure &amp; Fantasy (8.5), Strong contender with excellent audience approval and </a:t>
+            </a:r>
+            <a:r>
+              <a:rPr lang="en-US" dirty="0" err="1" smtClean="0"/>
+              <a:t>reach.This</a:t>
+            </a:r>
+            <a:r>
+              <a:rPr lang="en-US" dirty="0" smtClean="0"/>
+              <a:t> </a:t>
+            </a:r>
+            <a:r>
+              <a:rPr lang="en-US" dirty="0"/>
+              <a:t>genre pair works well for epic journeys, mythical stories, or fantasy worlds — think Harry Potter or Lord of the Rings</a:t>
+            </a:r>
+            <a:r>
+              <a:rPr lang="en-US" dirty="0" smtClean="0"/>
+              <a:t>.</a:t>
+            </a:r>
+          </a:p>
+          <a:p>
+            <a:pPr marL="342900" indent="-342900">
+              <a:buAutoNum type="arabicPeriod"/>
+            </a:pPr>
+            <a:endParaRPr lang="en-US" dirty="0"/>
+          </a:p>
+          <a:p>
+            <a:pPr marL="342900" indent="-342900">
+              <a:buAutoNum type="arabicPeriod"/>
+            </a:pPr>
+            <a:r>
+              <a:rPr lang="en-US" dirty="0" smtClean="0"/>
+              <a:t>Genres </a:t>
+            </a:r>
+            <a:r>
+              <a:rPr lang="en-US" dirty="0"/>
+              <a:t>to Watch </a:t>
+            </a:r>
+            <a:r>
+              <a:rPr lang="en-US" dirty="0" err="1"/>
+              <a:t>Carefully:Some</a:t>
+            </a:r>
+            <a:r>
+              <a:rPr lang="en-US" dirty="0"/>
+              <a:t> genre pairs like Action &amp; Thriller have decent popularity but relatively lower </a:t>
+            </a:r>
+            <a:r>
+              <a:rPr lang="en-US" dirty="0" err="1"/>
               <a:t>vote_average</a:t>
             </a:r>
             <a:r>
-              <a:rPr dirty="0"/>
-              <a:t> such as genre, release year, and vote count.</a:t>
+              <a:rPr lang="en-US" dirty="0"/>
+              <a:t>.</a:t>
             </a:r>
           </a:p>
         </p:txBody>
       </p:sp>
     </p:spTree>
+    <p:extLst>
+      <p:ext uri="{BB962C8B-B14F-4D97-AF65-F5344CB8AC3E}">
+        <p14:creationId xmlns:p14="http://schemas.microsoft.com/office/powerpoint/2010/main" val="1590936006"/>
+      </p:ext>
+    </p:extLst>
   </p:cSld>
   <p:clrMapOvr>
     <a:masterClrMapping/>
@@ -8766,64 +10479,72 @@
             <p:ph type="title"/>
           </p:nvPr>
         </p:nvSpPr>
+        <p:spPr/>
+        <p:txBody>
+          <a:bodyPr>
+            <a:normAutofit fontScale="90000"/>
+          </a:bodyPr>
+          <a:lstStyle/>
+          <a:p>
+            <a:r>
+              <a:rPr sz="2800" dirty="0" smtClean="0"/>
+              <a:t> </a:t>
+            </a:r>
+            <a:r>
+              <a:rPr lang="en-US" sz="2800" b="1" dirty="0" smtClean="0"/>
+              <a:t>Results and findings:</a:t>
+            </a:r>
+            <a:r>
+              <a:rPr lang="en-US" sz="2800" dirty="0" smtClean="0"/>
+              <a:t/>
+            </a:r>
+            <a:br>
+              <a:rPr lang="en-US" sz="2800" dirty="0" smtClean="0"/>
+            </a:br>
+            <a:r>
+              <a:rPr lang="en-US" sz="2800" dirty="0"/>
+              <a:t/>
+            </a:r>
+            <a:br>
+              <a:rPr lang="en-US" sz="2800" dirty="0"/>
+            </a:br>
+            <a:r>
+              <a:rPr sz="2800" dirty="0" smtClean="0"/>
+              <a:t>Audience </a:t>
+            </a:r>
+            <a:r>
+              <a:rPr sz="2800" dirty="0"/>
+              <a:t>Engagement</a:t>
+            </a:r>
+          </a:p>
+        </p:txBody>
+      </p:sp>
+      <p:pic>
+        <p:nvPicPr>
+          <p:cNvPr id="4" name="Content Placeholder 3"/>
+          <p:cNvPicPr>
+            <a:picLocks noGrp="1" noChangeAspect="1"/>
+          </p:cNvPicPr>
+          <p:nvPr>
+            <p:ph idx="1"/>
+          </p:nvPr>
+        </p:nvPicPr>
+        <p:blipFill>
+          <a:blip r:embed="rId2"/>
+          <a:stretch>
+            <a:fillRect/>
+          </a:stretch>
+        </p:blipFill>
         <p:spPr>
           <a:xfrm>
-            <a:off x="1945201" y="624110"/>
-            <a:ext cx="6589199" cy="742872"/>
+            <a:off x="1376218" y="2133600"/>
+            <a:ext cx="6766972" cy="3778250"/>
           </a:xfrm>
+          <a:prstGeom prst="rect">
+            <a:avLst/>
+          </a:prstGeom>
         </p:spPr>
-        <p:txBody>
-          <a:bodyPr>
-            <a:normAutofit/>
-          </a:bodyPr>
-          <a:lstStyle/>
-          <a:p>
-            <a:r>
-              <a:rPr sz="2800" b="1" dirty="0"/>
-              <a:t>Recommendations</a:t>
-            </a:r>
-          </a:p>
-        </p:txBody>
-      </p:sp>
-      <p:sp>
-        <p:nvSpPr>
-          <p:cNvPr id="3" name="Content Placeholder 2"/>
-          <p:cNvSpPr>
-            <a:spLocks noGrp="1"/>
-          </p:cNvSpPr>
-          <p:nvPr>
-            <p:ph idx="1"/>
-          </p:nvPr>
-        </p:nvSpPr>
-        <p:spPr>
-          <a:xfrm>
-            <a:off x="1942415" y="1505527"/>
-            <a:ext cx="6591985" cy="4405695"/>
-          </a:xfrm>
-        </p:spPr>
-        <p:txBody>
-          <a:bodyPr/>
-          <a:lstStyle/>
-          <a:p>
-            <a:r>
-              <a:rPr dirty="0"/>
-              <a:t>- Focus on producing Action, Adventure, and Fantasy films.</a:t>
-            </a:r>
-          </a:p>
-          <a:p>
-            <a:r>
-              <a:rPr dirty="0"/>
-              <a:t>- Prioritize stories that resonate globally and generate online engagement.</a:t>
-            </a:r>
-          </a:p>
-          <a:p>
-            <a:r>
-              <a:rPr dirty="0"/>
-              <a:t>- Consider genres that maintain consistent viewer ratings.</a:t>
-            </a:r>
-          </a:p>
-        </p:txBody>
-      </p:sp>
+      </p:pic>
     </p:spTree>
   </p:cSld>
   <p:clrMapOvr>
@@ -8851,73 +10572,168 @@
       </p:grpSpPr>
       <p:sp>
         <p:nvSpPr>
-          <p:cNvPr id="2" name="Title 1"/>
-          <p:cNvSpPr>
-            <a:spLocks noGrp="1"/>
-          </p:cNvSpPr>
-          <p:nvPr>
-            <p:ph type="title"/>
-          </p:nvPr>
+          <p:cNvPr id="4" name="Rectangle 3"/>
+          <p:cNvSpPr/>
+          <p:nvPr/>
         </p:nvSpPr>
         <p:spPr>
           <a:xfrm>
-            <a:off x="1945201" y="624110"/>
-            <a:ext cx="6589199" cy="807526"/>
+            <a:off x="1302327" y="1339272"/>
+            <a:ext cx="7546109" cy="5078313"/>
           </a:xfrm>
+          <a:prstGeom prst="rect">
+            <a:avLst/>
+          </a:prstGeom>
         </p:spPr>
         <p:txBody>
-          <a:bodyPr>
-            <a:normAutofit/>
+          <a:bodyPr wrap="square">
+            <a:spAutoFit/>
           </a:bodyPr>
           <a:lstStyle/>
           <a:p>
             <a:r>
-              <a:rPr sz="2800" b="1" dirty="0"/>
-              <a:t>Next Steps</a:t>
-            </a:r>
-          </a:p>
-        </p:txBody>
-      </p:sp>
-      <p:sp>
-        <p:nvSpPr>
-          <p:cNvPr id="3" name="Content Placeholder 2"/>
-          <p:cNvSpPr>
-            <a:spLocks noGrp="1"/>
-          </p:cNvSpPr>
-          <p:nvPr>
-            <p:ph idx="1"/>
-          </p:nvPr>
-        </p:nvSpPr>
-        <p:spPr>
-          <a:xfrm>
-            <a:off x="1942415" y="1431636"/>
-            <a:ext cx="6591985" cy="4479586"/>
-          </a:xfrm>
-        </p:spPr>
-        <p:txBody>
-          <a:bodyPr/>
-          <a:lstStyle/>
-          <a:p>
-            <a:r>
-              <a:rPr dirty="0"/>
-              <a:t>- Conduct deeper modeling to predict box office revenue.</a:t>
-            </a:r>
-          </a:p>
-          <a:p>
-            <a:r>
-              <a:rPr dirty="0"/>
-              <a:t>- Integrate marketing and budget data for richer insights.</a:t>
-            </a:r>
-          </a:p>
-          <a:p>
-            <a:r>
-              <a:rPr dirty="0"/>
-              <a:t>- Test concepts with focus groups aligned with top genres.</a:t>
+              <a:rPr lang="en-US" dirty="0" smtClean="0"/>
+              <a:t>Audience engagement </a:t>
+            </a:r>
+            <a:r>
+              <a:rPr lang="en-US" dirty="0" err="1" smtClean="0"/>
+              <a:t>contd</a:t>
+            </a:r>
+            <a:r>
+              <a:rPr lang="en-US" dirty="0" smtClean="0"/>
+              <a:t>….</a:t>
+            </a:r>
+          </a:p>
+          <a:p>
+            <a:pPr marL="285750" indent="-285750">
+              <a:buFont typeface="Arial" panose="020B0604020202020204" pitchFamily="34" charset="0"/>
+              <a:buChar char="•"/>
+            </a:pPr>
+            <a:endParaRPr lang="en-US" dirty="0" smtClean="0"/>
+          </a:p>
+          <a:p>
+            <a:pPr marL="285750" indent="-285750">
+              <a:buFont typeface="Arial" panose="020B0604020202020204" pitchFamily="34" charset="0"/>
+              <a:buChar char="•"/>
+            </a:pPr>
+            <a:r>
+              <a:rPr lang="en-US" dirty="0"/>
+              <a:t>M</a:t>
+            </a:r>
+            <a:r>
+              <a:rPr lang="en-US" dirty="0" smtClean="0"/>
+              <a:t>ajority </a:t>
+            </a:r>
+            <a:r>
+              <a:rPr lang="en-US" dirty="0"/>
+              <a:t>of movies seem to have low-to-moderate engagement (around 100 to 1,000 votes). This could be due to independent or niche films that don't reach mass audiences</a:t>
+            </a:r>
+            <a:r>
+              <a:rPr lang="en-US" dirty="0" smtClean="0"/>
+              <a:t>.</a:t>
+            </a:r>
+          </a:p>
+          <a:p>
+            <a:pPr marL="285750" indent="-285750">
+              <a:buFont typeface="Arial" panose="020B0604020202020204" pitchFamily="34" charset="0"/>
+              <a:buChar char="•"/>
+            </a:pPr>
+            <a:r>
+              <a:rPr lang="en-US" dirty="0" smtClean="0"/>
+              <a:t>The </a:t>
+            </a:r>
+            <a:r>
+              <a:rPr lang="en-US" dirty="0"/>
+              <a:t>long tail of high vote counts is an indicator of a few blockbusters or popular movies that generate significant attention (e.g., Avengers, Harry Potter, etc</a:t>
+            </a:r>
+            <a:r>
+              <a:rPr lang="en-US" dirty="0" smtClean="0"/>
+              <a:t>.).</a:t>
+            </a:r>
+          </a:p>
+          <a:p>
+            <a:endParaRPr lang="en-US" dirty="0"/>
+          </a:p>
+          <a:p>
+            <a:pPr marL="285750" indent="-285750">
+              <a:buFont typeface="Arial" panose="020B0604020202020204" pitchFamily="34" charset="0"/>
+              <a:buChar char="•"/>
+            </a:pPr>
+            <a:r>
+              <a:rPr lang="en-US" b="1" dirty="0" smtClean="0"/>
+              <a:t>Actionable </a:t>
+            </a:r>
+            <a:r>
+              <a:rPr lang="en-US" b="1" dirty="0" err="1"/>
+              <a:t>Insights</a:t>
+            </a:r>
+            <a:r>
+              <a:rPr lang="en-US" dirty="0" err="1"/>
+              <a:t>:Studios</a:t>
+            </a:r>
+            <a:r>
+              <a:rPr lang="en-US" dirty="0"/>
+              <a:t> aiming for broader audience engagement might want to focus on genres that have a higher likelihood of generating high vote counts</a:t>
+            </a:r>
+            <a:r>
+              <a:rPr lang="en-US" dirty="0" smtClean="0"/>
+              <a:t>.</a:t>
+            </a:r>
+          </a:p>
+          <a:p>
+            <a:pPr marL="285750" indent="-285750">
+              <a:buFont typeface="Arial" panose="020B0604020202020204" pitchFamily="34" charset="0"/>
+              <a:buChar char="•"/>
+            </a:pPr>
+            <a:endParaRPr lang="en-US" dirty="0"/>
+          </a:p>
+          <a:p>
+            <a:pPr marL="285750" indent="-285750">
+              <a:buFont typeface="Arial" panose="020B0604020202020204" pitchFamily="34" charset="0"/>
+              <a:buChar char="•"/>
+            </a:pPr>
+            <a:r>
+              <a:rPr lang="en-US" dirty="0" smtClean="0"/>
+              <a:t> </a:t>
+            </a:r>
+            <a:r>
+              <a:rPr lang="en-US" dirty="0"/>
+              <a:t>Typically, action, adventure, and sci-fi genres see more engagement</a:t>
+            </a:r>
+            <a:r>
+              <a:rPr lang="en-US" dirty="0" smtClean="0"/>
+              <a:t>.</a:t>
+            </a:r>
+          </a:p>
+          <a:p>
+            <a:pPr marL="285750" indent="-285750">
+              <a:buFont typeface="Arial" panose="020B0604020202020204" pitchFamily="34" charset="0"/>
+              <a:buChar char="•"/>
+            </a:pPr>
+            <a:endParaRPr lang="en-US" dirty="0"/>
+          </a:p>
+          <a:p>
+            <a:pPr marL="285750" indent="-285750">
+              <a:buFont typeface="Arial" panose="020B0604020202020204" pitchFamily="34" charset="0"/>
+              <a:buChar char="•"/>
+            </a:pPr>
+            <a:r>
+              <a:rPr lang="en-US" dirty="0" smtClean="0"/>
+              <a:t>Targeting </a:t>
+            </a:r>
+            <a:r>
+              <a:rPr lang="en-US" dirty="0"/>
+              <a:t>niche genres with consistent moderate engagement may be a way to ensure sustained, smaller but loyal audiences.</a:t>
             </a:r>
           </a:p>
         </p:txBody>
       </p:sp>
     </p:spTree>
+    <p:extLst>
+      <p:ext uri="{BB962C8B-B14F-4D97-AF65-F5344CB8AC3E}">
+        <p14:creationId xmlns:p14="http://schemas.microsoft.com/office/powerpoint/2010/main" val="3097085777"/>
+      </p:ext>
+    </p:extLst>
   </p:cSld>
   <p:clrMapOvr>
     <a:masterClrMapping/>

</xml_diff>